<commit_message>
Điều chỉnh bài 7, bài 8
</commit_message>
<xml_diff>
--- a/Bai 8 Đánh giá kết quả  tìm kiếm_phần 2.pptx
+++ b/Bai 8 Đánh giá kết quả  tìm kiếm_phần 2.pptx
@@ -162,7 +162,7 @@
   </p:defaultTextStyle>
   <p:extLst>
     <p:ext uri="{EFAFB233-063F-42B5-8137-9DF3F51BA10A}">
-      <p15:sldGuideLst xmlns:p15="http://schemas.microsoft.com/office/powerpoint/2012/main" xmlns="">
+      <p15:sldGuideLst xmlns="" xmlns:p15="http://schemas.microsoft.com/office/powerpoint/2012/main">
         <p15:guide id="1" orient="horz" pos="2160">
           <p15:clr>
             <a:srgbClr val="A4A3A4"/>
@@ -9567,11 +9567,11 @@
             <a:pPr algn="just" eaLnBrk="1" hangingPunct="1"/>
             <a:r>
               <a:rPr lang="en-US" altLang="ru-RU" sz="2800" dirty="0" err="1" smtClean="0"/>
-              <a:t>Chương</a:t>
+              <a:t>Bài</a:t>
             </a:r>
             <a:r>
               <a:rPr lang="en-US" altLang="ru-RU" sz="2800" dirty="0" smtClean="0"/>
-              <a:t> 7. </a:t>
+              <a:t> 8. </a:t>
             </a:r>
             <a:r>
               <a:rPr lang="en-US" altLang="ru-RU" sz="2800" dirty="0" err="1" smtClean="0"/>
@@ -9616,13 +9616,17 @@
             <a:r>
               <a:rPr lang="en-US" altLang="ru-RU" sz="2800" dirty="0" err="1" smtClean="0"/>
               <a:t>kiếm</a:t>
+            </a:r>
+            <a:r>
+              <a:rPr lang="en-US" altLang="ru-RU" sz="2800" dirty="0" smtClean="0"/>
+              <a:t> (2)</a:t>
             </a:r>
             <a:endParaRPr lang="en-US" altLang="ru-RU" sz="2800" dirty="0" smtClean="0"/>
           </a:p>
           <a:p>
             <a:pPr algn="just" eaLnBrk="1" hangingPunct="1"/>
             <a:r>
-              <a:rPr lang="en-US" sz="2800" smtClean="0"/>
+              <a:rPr lang="en-US" sz="2800" dirty="0" smtClean="0"/>
               <a:t>IIR.C8</a:t>
             </a:r>
             <a:r>
@@ -10425,15 +10429,7 @@
             </a:r>
             <a:r>
               <a:rPr lang="en-US" altLang="ru-RU" dirty="0" err="1" smtClean="0"/>
-              <a:t>mức</a:t>
-            </a:r>
-            <a:r>
-              <a:rPr lang="en-US" altLang="ru-RU" dirty="0" smtClean="0"/>
-              <a:t> </a:t>
-            </a:r>
-            <a:r>
-              <a:rPr lang="en-US" altLang="ru-RU" dirty="0" err="1" smtClean="0"/>
-              <a:t>hữu</a:t>
+              <a:t>lợi</a:t>
             </a:r>
             <a:r>
               <a:rPr lang="en-US" altLang="ru-RU" dirty="0" smtClean="0"/>
@@ -10463,8 +10459,8 @@
           </a:p>
         </p:txBody>
       </p:sp>
-      <mc:AlternateContent xmlns:mc="http://schemas.openxmlformats.org/markup-compatibility/2006" xmlns:a14="http://schemas.microsoft.com/office/drawing/2010/main">
-        <mc:Choice Requires="a14">
+      <mc:AlternateContent xmlns:mc="http://schemas.openxmlformats.org/markup-compatibility/2006">
+        <mc:Choice xmlns:a14="http://schemas.microsoft.com/office/drawing/2010/main" Requires="a14">
           <p:sp>
             <p:nvSpPr>
               <p:cNvPr id="16388" name="Rectangle 3"/>
@@ -10478,7 +10474,7 @@
             <p:spPr>
               <a:xfrm>
                 <a:off x="611560" y="1989138"/>
-                <a:ext cx="8303840" cy="2159942"/>
+                <a:ext cx="8303840" cy="3240062"/>
               </a:xfrm>
             </p:spPr>
             <p:txBody>
@@ -10487,82 +10483,146 @@
               <a:p>
                 <a:pPr eaLnBrk="1" hangingPunct="1"/>
                 <a:r>
-                  <a:rPr lang="en-US" altLang="ru-RU" dirty="0" smtClean="0"/>
+                  <a:rPr lang="vi-VN" altLang="ru-RU" sz="2400" dirty="0"/>
+                  <a:t>Kêt quả </a:t>
+                </a:r>
+                <a:r>
+                  <a:rPr lang="vi-VN" altLang="ru-RU" sz="2400" dirty="0" smtClean="0"/>
+                  <a:t>càng </a:t>
+                </a:r>
+                <a:r>
+                  <a:rPr lang="vi-VN" altLang="ru-RU" sz="2400" dirty="0"/>
+                  <a:t>xa vị trí đầu danh sách càng kém hữu ích</a:t>
+                </a:r>
+                <a:r>
+                  <a:rPr lang="en-US" altLang="ru-RU" sz="2400" dirty="0"/>
+                  <a:t> (</a:t>
+                </a:r>
+                <a:r>
+                  <a:rPr lang="en-US" altLang="ru-RU" sz="2400" dirty="0" err="1"/>
+                  <a:t>lợi</a:t>
+                </a:r>
+                <a:r>
+                  <a:rPr lang="en-US" altLang="ru-RU" sz="2400" dirty="0"/>
+                  <a:t> </a:t>
+                </a:r>
+                <a:r>
+                  <a:rPr lang="en-US" altLang="ru-RU" sz="2400" dirty="0" err="1"/>
+                  <a:t>ích</a:t>
+                </a:r>
+                <a:r>
+                  <a:rPr lang="en-US" altLang="ru-RU" sz="2400" dirty="0"/>
+                  <a:t> </a:t>
+                </a:r>
+                <a:r>
+                  <a:rPr lang="en-US" altLang="ru-RU" sz="2400" dirty="0" err="1"/>
+                  <a:t>bị</a:t>
+                </a:r>
+                <a:r>
+                  <a:rPr lang="en-US" altLang="ru-RU" sz="2400" dirty="0"/>
+                  <a:t> </a:t>
+                </a:r>
+                <a:r>
+                  <a:rPr lang="en-US" altLang="ru-RU" sz="2400" dirty="0" err="1"/>
+                  <a:t>thuyên</a:t>
+                </a:r>
+                <a:r>
+                  <a:rPr lang="en-US" altLang="ru-RU" sz="2400" dirty="0"/>
+                  <a:t> </a:t>
+                </a:r>
+                <a:r>
+                  <a:rPr lang="en-US" altLang="ru-RU" sz="2400" dirty="0" err="1"/>
+                  <a:t>giảm</a:t>
+                </a:r>
+                <a:r>
+                  <a:rPr lang="en-US" altLang="ru-RU" sz="2400" dirty="0"/>
+                  <a:t>)</a:t>
+                </a:r>
+                <a:r>
+                  <a:rPr lang="vi-VN" altLang="ru-RU" sz="2400" dirty="0" smtClean="0"/>
+                  <a:t>;</a:t>
+                </a:r>
+                <a:endParaRPr lang="en-US" altLang="ru-RU" sz="2400" dirty="0" smtClean="0"/>
+              </a:p>
+              <a:p>
+                <a:pPr eaLnBrk="1" hangingPunct="1"/>
+                <a:r>
+                  <a:rPr lang="en-US" altLang="ru-RU" sz="2400" dirty="0" smtClean="0"/>
                   <a:t>DCG </a:t>
                 </a:r>
                 <a:r>
-                  <a:rPr lang="en-US" altLang="ru-RU" dirty="0" err="1" smtClean="0"/>
+                  <a:rPr lang="en-US" altLang="ru-RU" sz="2400" dirty="0" err="1" smtClean="0"/>
                   <a:t>tại</a:t>
                 </a:r>
                 <a:r>
-                  <a:rPr lang="en-US" altLang="ru-RU" dirty="0" smtClean="0"/>
+                  <a:rPr lang="en-US" altLang="ru-RU" sz="2400" dirty="0" smtClean="0"/>
                   <a:t> </a:t>
                 </a:r>
                 <a:r>
-                  <a:rPr lang="en-US" altLang="ru-RU" dirty="0" err="1" smtClean="0"/>
+                  <a:rPr lang="en-US" altLang="ru-RU" sz="2400" dirty="0" err="1" smtClean="0"/>
                   <a:t>vị</a:t>
                 </a:r>
                 <a:r>
-                  <a:rPr lang="en-US" altLang="ru-RU" dirty="0" smtClean="0"/>
+                  <a:rPr lang="en-US" altLang="ru-RU" sz="2400" dirty="0" smtClean="0"/>
                   <a:t> </a:t>
                 </a:r>
                 <a:r>
-                  <a:rPr lang="en-US" altLang="ru-RU" dirty="0" err="1" smtClean="0"/>
+                  <a:rPr lang="en-US" altLang="ru-RU" sz="2400" dirty="0" err="1" smtClean="0"/>
                   <a:t>trí</a:t>
                 </a:r>
                 <a:r>
-                  <a:rPr lang="en-US" altLang="ru-RU" dirty="0" smtClean="0"/>
+                  <a:rPr lang="en-US" altLang="ru-RU" sz="2400" dirty="0" smtClean="0"/>
                   <a:t> n</a:t>
                 </a:r>
               </a:p>
               <a:p>
                 <a:pPr lvl="1" eaLnBrk="1" hangingPunct="1"/>
                 <a:r>
-                  <a:rPr lang="en-US" altLang="ru-RU" sz="2800" dirty="0" smtClean="0"/>
+                  <a:rPr lang="en-US" altLang="ru-RU" dirty="0" smtClean="0"/>
                   <a:t>DCG = rel</a:t>
                 </a:r>
                 <a:r>
-                  <a:rPr lang="en-US" altLang="ru-RU" sz="2800" baseline="-25000" dirty="0" smtClean="0"/>
+                  <a:rPr lang="en-US" altLang="ru-RU" baseline="-25000" dirty="0" smtClean="0"/>
                   <a:t>1</a:t>
                 </a:r>
                 <a:r>
-                  <a:rPr lang="en-US" altLang="ru-RU" sz="2800" dirty="0" smtClean="0"/>
+                  <a:rPr lang="en-US" altLang="ru-RU" dirty="0" smtClean="0"/>
                   <a:t> + rel</a:t>
                 </a:r>
                 <a:r>
-                  <a:rPr lang="en-US" altLang="ru-RU" sz="2800" baseline="-25000" dirty="0" smtClean="0"/>
+                  <a:rPr lang="en-US" altLang="ru-RU" baseline="-25000" dirty="0" smtClean="0"/>
                   <a:t>2</a:t>
                 </a:r>
                 <a:r>
-                  <a:rPr lang="en-US" altLang="ru-RU" sz="2800" dirty="0" smtClean="0"/>
+                  <a:rPr lang="en-US" altLang="ru-RU" dirty="0" smtClean="0"/>
                   <a:t>/log</a:t>
                 </a:r>
                 <a:r>
-                  <a:rPr lang="en-US" altLang="ru-RU" sz="2800" baseline="-25000" dirty="0" smtClean="0"/>
+                  <a:rPr lang="en-US" altLang="ru-RU" baseline="-25000" dirty="0" smtClean="0"/>
                   <a:t>2</a:t>
                 </a:r>
                 <a:r>
-                  <a:rPr lang="en-US" altLang="ru-RU" sz="2800" dirty="0" smtClean="0"/>
+                  <a:rPr lang="en-US" altLang="ru-RU" dirty="0" smtClean="0"/>
                   <a:t>2 + … </a:t>
                 </a:r>
                 <a:r>
-                  <a:rPr lang="en-US" altLang="ru-RU" sz="2800" dirty="0" err="1" smtClean="0"/>
+                  <a:rPr lang="en-US" altLang="ru-RU" dirty="0" err="1" smtClean="0"/>
                   <a:t>rel</a:t>
                 </a:r>
                 <a:r>
-                  <a:rPr lang="en-US" altLang="ru-RU" sz="2800" baseline="-25000" dirty="0" err="1" smtClean="0"/>
+                  <a:rPr lang="en-US" altLang="ru-RU" baseline="-25000" dirty="0" err="1" smtClean="0"/>
                   <a:t>n</a:t>
                 </a:r>
                 <a:r>
-                  <a:rPr lang="en-US" altLang="ru-RU" sz="2800" dirty="0" smtClean="0"/>
+                  <a:rPr lang="en-US" altLang="ru-RU" dirty="0" smtClean="0"/>
                   <a:t>/log</a:t>
                 </a:r>
                 <a:r>
-                  <a:rPr lang="en-US" altLang="ru-RU" sz="2800" baseline="-25000" dirty="0" smtClean="0"/>
+                  <a:rPr lang="en-US" altLang="ru-RU" baseline="-25000" dirty="0" smtClean="0"/>
                   <a:t>2</a:t>
                 </a:r>
                 <a:r>
-                  <a:rPr lang="en-US" altLang="ru-RU" sz="2800" dirty="0" smtClean="0"/>
+                  <a:rPr lang="en-US" altLang="ru-RU" dirty="0" smtClean="0"/>
                   <a:t>n</a:t>
                 </a:r>
               </a:p>
@@ -10577,14 +10637,14 @@
                     <m:sSub>
                       <m:sSubPr>
                         <m:ctrlPr>
-                          <a:rPr lang="en-US" sz="3200" b="0" i="1" smtClean="0">
+                          <a:rPr lang="en-US" b="0" i="1" smtClean="0">
                             <a:latin typeface="Cambria Math"/>
                           </a:rPr>
                         </m:ctrlPr>
                       </m:sSubPr>
                       <m:e>
                         <m:r>
-                          <a:rPr lang="en-US" sz="3200" b="0" i="1" smtClean="0">
+                          <a:rPr lang="en-US" b="0" i="1" smtClean="0">
                             <a:latin typeface="Cambria Math" panose="02040503050406030204" pitchFamily="18" charset="0"/>
                           </a:rPr>
                           <m:t>𝐷𝐶𝐺</m:t>
@@ -10592,7 +10652,7 @@
                       </m:e>
                       <m:sub>
                         <m:r>
-                          <a:rPr lang="en-US" sz="3200" b="0" i="1" smtClean="0">
+                          <a:rPr lang="en-US" b="0" i="1" smtClean="0">
                             <a:latin typeface="Cambria Math" panose="02040503050406030204" pitchFamily="18" charset="0"/>
                           </a:rPr>
                           <m:t>𝑝</m:t>
@@ -10600,7 +10660,7 @@
                       </m:sub>
                     </m:sSub>
                     <m:r>
-                      <a:rPr lang="en-US" sz="3200" b="0" i="1" smtClean="0">
+                      <a:rPr lang="en-US" b="0" i="1" smtClean="0">
                         <a:latin typeface="Cambria Math" panose="02040503050406030204" pitchFamily="18" charset="0"/>
                       </a:rPr>
                       <m:t>=</m:t>
@@ -10608,14 +10668,14 @@
                     <m:sSub>
                       <m:sSubPr>
                         <m:ctrlPr>
-                          <a:rPr lang="en-US" sz="3200" b="0" i="1" smtClean="0">
+                          <a:rPr lang="en-US" b="0" i="1" smtClean="0">
                             <a:latin typeface="Cambria Math"/>
                           </a:rPr>
                         </m:ctrlPr>
                       </m:sSubPr>
                       <m:e>
                         <m:r>
-                          <a:rPr lang="en-US" sz="3200" b="0" i="1" smtClean="0">
+                          <a:rPr lang="en-US" b="0" i="1" smtClean="0">
                             <a:latin typeface="Cambria Math" panose="02040503050406030204" pitchFamily="18" charset="0"/>
                           </a:rPr>
                           <m:t>𝑟𝑒𝑙</m:t>
@@ -10623,7 +10683,7 @@
                       </m:e>
                       <m:sub>
                         <m:r>
-                          <a:rPr lang="en-US" sz="3200" b="0" i="1" smtClean="0">
+                          <a:rPr lang="en-US" b="0" i="1" smtClean="0">
                             <a:latin typeface="Cambria Math" panose="02040503050406030204" pitchFamily="18" charset="0"/>
                           </a:rPr>
                           <m:t>1</m:t>
@@ -10631,7 +10691,7 @@
                       </m:sub>
                     </m:sSub>
                     <m:r>
-                      <a:rPr lang="en-US" sz="3200" b="0" i="1" smtClean="0">
+                      <a:rPr lang="en-US" b="0" i="1" smtClean="0">
                         <a:latin typeface="Cambria Math" panose="02040503050406030204" pitchFamily="18" charset="0"/>
                       </a:rPr>
                       <m:t>+</m:t>
@@ -10640,7 +10700,7 @@
                       <m:naryPr>
                         <m:chr m:val="∑"/>
                         <m:ctrlPr>
-                          <a:rPr lang="en-US" sz="3200" b="0" i="1" smtClean="0">
+                          <a:rPr lang="en-US" b="0" i="1" smtClean="0">
                             <a:latin typeface="Cambria Math"/>
                           </a:rPr>
                         </m:ctrlPr>
@@ -10650,21 +10710,27 @@
                           <m:rPr>
                             <m:brk m:alnAt="23"/>
                           </m:rPr>
-                          <a:rPr lang="en-US" sz="3200" b="0" i="1" smtClean="0">
+                          <a:rPr lang="en-US" b="0" i="1" smtClean="0">
                             <a:latin typeface="Cambria Math" panose="02040503050406030204" pitchFamily="18" charset="0"/>
                           </a:rPr>
                           <m:t>𝑖</m:t>
                         </m:r>
                         <m:r>
-                          <a:rPr lang="en-US" sz="3200" b="0" i="1" smtClean="0">
+                          <a:rPr lang="en-US" b="0" i="1" smtClean="0">
                             <a:latin typeface="Cambria Math" panose="02040503050406030204" pitchFamily="18" charset="0"/>
                           </a:rPr>
-                          <m:t>=2</m:t>
+                          <m:t>=</m:t>
+                        </m:r>
+                        <m:r>
+                          <a:rPr lang="en-US" b="0" i="1" smtClean="0">
+                            <a:latin typeface="Cambria Math" panose="02040503050406030204" pitchFamily="18" charset="0"/>
+                          </a:rPr>
+                          <m:t>2</m:t>
                         </m:r>
                       </m:sub>
                       <m:sup>
                         <m:r>
-                          <a:rPr lang="en-US" sz="3200" b="0" i="1" smtClean="0">
+                          <a:rPr lang="en-US" b="0" i="1" smtClean="0">
                             <a:latin typeface="Cambria Math" panose="02040503050406030204" pitchFamily="18" charset="0"/>
                           </a:rPr>
                           <m:t>𝑛</m:t>
@@ -10674,7 +10740,7 @@
                         <m:f>
                           <m:fPr>
                             <m:ctrlPr>
-                              <a:rPr lang="en-US" sz="3200" b="0" i="1" smtClean="0">
+                              <a:rPr lang="en-US" b="0" i="1" smtClean="0">
                                 <a:latin typeface="Cambria Math"/>
                               </a:rPr>
                             </m:ctrlPr>
@@ -10683,14 +10749,14 @@
                             <m:sSub>
                               <m:sSubPr>
                                 <m:ctrlPr>
-                                  <a:rPr lang="en-US" sz="3200" b="0" i="1" smtClean="0">
+                                  <a:rPr lang="en-US" b="0" i="1" smtClean="0">
                                     <a:latin typeface="Cambria Math"/>
                                   </a:rPr>
                                 </m:ctrlPr>
                               </m:sSubPr>
                               <m:e>
                                 <m:r>
-                                  <a:rPr lang="en-US" sz="3200" b="0" i="1" smtClean="0">
+                                  <a:rPr lang="en-US" b="0" i="1" smtClean="0">
                                     <a:latin typeface="Cambria Math" panose="02040503050406030204" pitchFamily="18" charset="0"/>
                                   </a:rPr>
                                   <m:t>𝑟𝑒𝑙</m:t>
@@ -10698,7 +10764,7 @@
                               </m:e>
                               <m:sub>
                                 <m:r>
-                                  <a:rPr lang="en-US" sz="3200" b="0" i="1" smtClean="0">
+                                  <a:rPr lang="en-US" b="0" i="1" smtClean="0">
                                     <a:latin typeface="Cambria Math" panose="02040503050406030204" pitchFamily="18" charset="0"/>
                                   </a:rPr>
                                   <m:t>𝑖</m:t>
@@ -10710,14 +10776,14 @@
                             <m:sSub>
                               <m:sSubPr>
                                 <m:ctrlPr>
-                                  <a:rPr lang="en-US" sz="3200" b="0" i="1" smtClean="0">
+                                  <a:rPr lang="en-US" b="0" i="1" smtClean="0">
                                     <a:latin typeface="Cambria Math"/>
                                   </a:rPr>
                                 </m:ctrlPr>
                               </m:sSubPr>
                               <m:e>
                                 <m:r>
-                                  <a:rPr lang="en-US" sz="3200" b="0" i="1" smtClean="0">
+                                  <a:rPr lang="en-US" b="0" i="1" smtClean="0">
                                     <a:latin typeface="Cambria Math" panose="02040503050406030204" pitchFamily="18" charset="0"/>
                                   </a:rPr>
                                   <m:t>𝑙𝑜𝑔</m:t>
@@ -10725,7 +10791,7 @@
                               </m:e>
                               <m:sub>
                                 <m:r>
-                                  <a:rPr lang="en-US" sz="3200" b="0" i="1" smtClean="0">
+                                  <a:rPr lang="en-US" b="0" i="1" smtClean="0">
                                     <a:latin typeface="Cambria Math" panose="02040503050406030204" pitchFamily="18" charset="0"/>
                                   </a:rPr>
                                   <m:t>2</m:t>
@@ -10733,7 +10799,7 @@
                               </m:sub>
                             </m:sSub>
                             <m:r>
-                              <a:rPr lang="en-US" sz="3200" b="0" i="1" smtClean="0">
+                              <a:rPr lang="en-US" b="0" i="1" smtClean="0">
                                 <a:latin typeface="Cambria Math" panose="02040503050406030204" pitchFamily="18" charset="0"/>
                               </a:rPr>
                               <m:t>𝑖</m:t>
@@ -10744,12 +10810,27 @@
                     </m:nary>
                   </m:oMath>
                 </a14:m>
-                <a:endParaRPr lang="en-US" altLang="ru-RU" dirty="0" smtClean="0"/>
+                <a:endParaRPr lang="en-US" altLang="ru-RU" sz="2400" dirty="0" smtClean="0">
+                  <a:solidFill>
+                    <a:schemeClr val="tx2"/>
+                  </a:solidFill>
+                </a:endParaRPr>
+              </a:p>
+              <a:p>
+                <a:pPr eaLnBrk="1" hangingPunct="1"/>
+                <a:r>
+                  <a:rPr lang="vi-VN" altLang="ru-RU" sz="2400" dirty="0" smtClean="0"/>
+                  <a:t>Có thể sử dụng hệ cơ số bất kỳ cho hàm log</a:t>
+                </a:r>
+              </a:p>
+              <a:p>
+                <a:pPr eaLnBrk="1" hangingPunct="1"/>
+                <a:endParaRPr lang="en-US" altLang="ru-RU" sz="2400" dirty="0" smtClean="0"/>
               </a:p>
             </p:txBody>
           </p:sp>
         </mc:Choice>
-        <mc:Fallback xmlns="">
+        <mc:Fallback>
           <p:sp>
             <p:nvSpPr>
               <p:cNvPr id="16388" name="Rectangle 3"/>
@@ -10763,12 +10844,12 @@
             <p:spPr>
               <a:xfrm>
                 <a:off x="611560" y="1989138"/>
-                <a:ext cx="8303840" cy="2159942"/>
+                <a:ext cx="8303840" cy="3240062"/>
               </a:xfrm>
               <a:blipFill rotWithShape="1">
                 <a:blip r:embed="rId3"/>
                 <a:stretch>
-                  <a:fillRect l="-293" t="-2817"/>
+                  <a:fillRect l="-73" t="-1504" b="-4323"/>
                 </a:stretch>
               </a:blipFill>
             </p:spPr>
@@ -10777,7 +10858,7 @@
               <a:lstStyle/>
               <a:p>
                 <a:r>
-                  <a:rPr lang="vi-VN">
+                  <a:rPr lang="en-US">
                     <a:noFill/>
                   </a:rPr>
                   <a:t> </a:t>
@@ -11008,7 +11089,7 @@
             </a:lvl9pPr>
           </a:lstStyle>
           <a:p>
-            <a:pPr algn="r">
+            <a:pPr algn="just">
               <a:spcBef>
                 <a:spcPct val="0"/>
               </a:spcBef>
@@ -11018,15 +11099,15 @@
               <a:buNone/>
             </a:pPr>
             <a:r>
-              <a:rPr lang="en-US" altLang="ru-RU" sz="2400" i="1" dirty="0" err="1">
+              <a:rPr lang="en-US" altLang="ru-RU" sz="2400" dirty="0" err="1" smtClean="0">
                 <a:solidFill>
                   <a:schemeClr val="tx2"/>
                 </a:solidFill>
               </a:rPr>
-              <a:t>Có</a:t>
-            </a:r>
-            <a:r>
-              <a:rPr lang="en-US" altLang="ru-RU" sz="2400" i="1" dirty="0">
+              <a:t>Thuật</a:t>
+            </a:r>
+            <a:r>
+              <a:rPr lang="en-US" altLang="ru-RU" sz="2400" dirty="0" smtClean="0">
                 <a:solidFill>
                   <a:schemeClr val="tx2"/>
                 </a:solidFill>
@@ -11034,172 +11115,20 @@
               <a:t> </a:t>
             </a:r>
             <a:r>
-              <a:rPr lang="en-US" altLang="ru-RU" sz="2400" i="1" dirty="0" err="1">
+              <a:rPr lang="en-US" altLang="ru-RU" sz="2400" dirty="0" err="1" smtClean="0">
                 <a:solidFill>
                   <a:schemeClr val="tx2"/>
                 </a:solidFill>
               </a:rPr>
-              <a:t>thể</a:t>
-            </a:r>
-            <a:r>
-              <a:rPr lang="en-US" altLang="ru-RU" sz="2400" i="1" dirty="0">
+              <a:t>ngữ</a:t>
+            </a:r>
+            <a:r>
+              <a:rPr lang="en-US" altLang="ru-RU" sz="2400" dirty="0" smtClean="0">
                 <a:solidFill>
                   <a:schemeClr val="tx2"/>
                 </a:solidFill>
               </a:rPr>
-              <a:t> </a:t>
-            </a:r>
-            <a:r>
-              <a:rPr lang="en-US" altLang="ru-RU" sz="2400" i="1" dirty="0" err="1">
-                <a:solidFill>
-                  <a:schemeClr val="tx2"/>
-                </a:solidFill>
-              </a:rPr>
-              <a:t>sử</a:t>
-            </a:r>
-            <a:r>
-              <a:rPr lang="en-US" altLang="ru-RU" sz="2400" i="1" dirty="0">
-                <a:solidFill>
-                  <a:schemeClr val="tx2"/>
-                </a:solidFill>
-              </a:rPr>
-              <a:t> </a:t>
-            </a:r>
-            <a:r>
-              <a:rPr lang="en-US" altLang="ru-RU" sz="2400" i="1" dirty="0" err="1">
-                <a:solidFill>
-                  <a:schemeClr val="tx2"/>
-                </a:solidFill>
-              </a:rPr>
-              <a:t>dụng</a:t>
-            </a:r>
-            <a:r>
-              <a:rPr lang="en-US" altLang="ru-RU" sz="2400" i="1" dirty="0">
-                <a:solidFill>
-                  <a:schemeClr val="tx2"/>
-                </a:solidFill>
-              </a:rPr>
-              <a:t> </a:t>
-            </a:r>
-            <a:r>
-              <a:rPr lang="en-US" altLang="ru-RU" sz="2400" i="1" dirty="0" err="1">
-                <a:solidFill>
-                  <a:schemeClr val="tx2"/>
-                </a:solidFill>
-              </a:rPr>
-              <a:t>hệ</a:t>
-            </a:r>
-            <a:r>
-              <a:rPr lang="en-US" altLang="ru-RU" sz="2400" i="1" dirty="0">
-                <a:solidFill>
-                  <a:schemeClr val="tx2"/>
-                </a:solidFill>
-              </a:rPr>
-              <a:t> </a:t>
-            </a:r>
-            <a:r>
-              <a:rPr lang="en-US" altLang="ru-RU" sz="2400" i="1" dirty="0" err="1">
-                <a:solidFill>
-                  <a:schemeClr val="tx2"/>
-                </a:solidFill>
-              </a:rPr>
-              <a:t>cơ</a:t>
-            </a:r>
-            <a:r>
-              <a:rPr lang="en-US" altLang="ru-RU" sz="2400" i="1" dirty="0">
-                <a:solidFill>
-                  <a:schemeClr val="tx2"/>
-                </a:solidFill>
-              </a:rPr>
-              <a:t> </a:t>
-            </a:r>
-            <a:r>
-              <a:rPr lang="en-US" altLang="ru-RU" sz="2400" i="1" dirty="0" err="1">
-                <a:solidFill>
-                  <a:schemeClr val="tx2"/>
-                </a:solidFill>
-              </a:rPr>
-              <a:t>số</a:t>
-            </a:r>
-            <a:r>
-              <a:rPr lang="en-US" altLang="ru-RU" sz="2400" i="1" dirty="0">
-                <a:solidFill>
-                  <a:schemeClr val="tx2"/>
-                </a:solidFill>
-              </a:rPr>
-              <a:t> </a:t>
-            </a:r>
-            <a:r>
-              <a:rPr lang="en-US" altLang="ru-RU" sz="2400" i="1" dirty="0" err="1">
-                <a:solidFill>
-                  <a:schemeClr val="tx2"/>
-                </a:solidFill>
-              </a:rPr>
-              <a:t>bất</a:t>
-            </a:r>
-            <a:r>
-              <a:rPr lang="en-US" altLang="ru-RU" sz="2400" i="1" dirty="0">
-                <a:solidFill>
-                  <a:schemeClr val="tx2"/>
-                </a:solidFill>
-              </a:rPr>
-              <a:t> </a:t>
-            </a:r>
-            <a:r>
-              <a:rPr lang="en-US" altLang="ru-RU" sz="2400" i="1" dirty="0" err="1">
-                <a:solidFill>
-                  <a:schemeClr val="tx2"/>
-                </a:solidFill>
-              </a:rPr>
-              <a:t>kỳ</a:t>
-            </a:r>
-            <a:r>
-              <a:rPr lang="en-US" altLang="ru-RU" sz="2400" i="1" dirty="0">
-                <a:solidFill>
-                  <a:schemeClr val="tx2"/>
-                </a:solidFill>
-              </a:rPr>
-              <a:t> </a:t>
-            </a:r>
-            <a:r>
-              <a:rPr lang="en-US" altLang="ru-RU" sz="2400" i="1" dirty="0" err="1">
-                <a:solidFill>
-                  <a:schemeClr val="tx2"/>
-                </a:solidFill>
-              </a:rPr>
-              <a:t>cho</a:t>
-            </a:r>
-            <a:r>
-              <a:rPr lang="en-US" altLang="ru-RU" sz="2400" i="1" dirty="0">
-                <a:solidFill>
-                  <a:schemeClr val="tx2"/>
-                </a:solidFill>
-              </a:rPr>
-              <a:t> </a:t>
-            </a:r>
-            <a:r>
-              <a:rPr lang="en-US" altLang="ru-RU" sz="2400" i="1" dirty="0" err="1">
-                <a:solidFill>
-                  <a:schemeClr val="tx2"/>
-                </a:solidFill>
-              </a:rPr>
-              <a:t>hàm</a:t>
-            </a:r>
-            <a:r>
-              <a:rPr lang="en-US" altLang="ru-RU" sz="2400" i="1" dirty="0">
-                <a:solidFill>
-                  <a:schemeClr val="tx2"/>
-                </a:solidFill>
-              </a:rPr>
-              <a:t> </a:t>
-            </a:r>
-            <a:r>
-              <a:rPr lang="en-US" altLang="ru-RU" sz="2400" i="1" dirty="0" smtClean="0">
-                <a:solidFill>
-                  <a:schemeClr val="tx2"/>
-                </a:solidFill>
-              </a:rPr>
-              <a:t>log</a:t>
+              <a:t>:</a:t>
             </a:r>
           </a:p>
           <a:p>
@@ -11213,6 +11142,14 @@
               <a:buNone/>
             </a:pPr>
             <a:r>
+              <a:rPr lang="en-US" altLang="ru-RU" sz="2400" dirty="0" smtClean="0">
+                <a:solidFill>
+                  <a:schemeClr val="tx2"/>
+                </a:solidFill>
+              </a:rPr>
+              <a:t>	</a:t>
+            </a:r>
+            <a:r>
               <a:rPr lang="en-US" altLang="ru-RU" sz="2400" dirty="0" err="1" smtClean="0">
                 <a:solidFill>
                   <a:schemeClr val="tx2"/>
@@ -11234,7 +11171,7 @@
                   <a:schemeClr val="tx2"/>
                 </a:solidFill>
               </a:rPr>
-              <a:t>mức</a:t>
+              <a:t>lợi</a:t>
             </a:r>
             <a:r>
               <a:rPr lang="en-US" altLang="ru-RU" sz="2400" dirty="0" smtClean="0">
@@ -11250,7 +11187,7 @@
                   <a:schemeClr val="tx2"/>
                 </a:solidFill>
               </a:rPr>
-              <a:t>lợi</a:t>
+              <a:t>ích</a:t>
             </a:r>
             <a:r>
               <a:rPr lang="en-US" altLang="ru-RU" sz="2400" dirty="0" smtClean="0">
@@ -11266,7 +11203,7 @@
                   <a:schemeClr val="tx2"/>
                 </a:solidFill>
               </a:rPr>
-              <a:t>ích</a:t>
+              <a:t>thuyên</a:t>
             </a:r>
             <a:r>
               <a:rPr lang="en-US" altLang="ru-RU" sz="2400" dirty="0" smtClean="0">
@@ -11282,7 +11219,7 @@
                   <a:schemeClr val="tx2"/>
                 </a:solidFill>
               </a:rPr>
-              <a:t>thuyên</a:t>
+              <a:t>giảm</a:t>
             </a:r>
             <a:r>
               <a:rPr lang="en-US" altLang="ru-RU" sz="2400" dirty="0" smtClean="0">
@@ -11290,15 +11227,26 @@
                   <a:schemeClr val="tx2"/>
                 </a:solidFill>
               </a:rPr>
-              <a:t> </a:t>
-            </a:r>
-            <a:r>
-              <a:rPr lang="en-US" altLang="ru-RU" sz="2400" dirty="0" err="1" smtClean="0">
+              <a:t>:</a:t>
+            </a:r>
+          </a:p>
+          <a:p>
+            <a:pPr algn="just">
+              <a:spcBef>
+                <a:spcPct val="0"/>
+              </a:spcBef>
+              <a:buClrTx/>
+              <a:buSzTx/>
+              <a:buFontTx/>
+              <a:buNone/>
+            </a:pPr>
+            <a:r>
+              <a:rPr lang="en-US" altLang="ru-RU" sz="2400" dirty="0">
                 <a:solidFill>
                   <a:schemeClr val="tx2"/>
                 </a:solidFill>
               </a:rPr>
-              <a:t>giảm</a:t>
+              <a:t>	</a:t>
             </a:r>
             <a:r>
               <a:rPr lang="en-US" altLang="ru-RU" sz="2400" dirty="0" smtClean="0">
@@ -11306,7 +11254,7 @@
                   <a:schemeClr val="tx2"/>
                 </a:solidFill>
               </a:rPr>
-              <a:t>: </a:t>
+              <a:t>DCG: </a:t>
             </a:r>
             <a:r>
               <a:rPr lang="en-US" altLang="ru-RU" sz="2400" dirty="0">
@@ -11314,7 +11262,7 @@
                   <a:schemeClr val="tx2"/>
                 </a:solidFill>
               </a:rPr>
-              <a:t>DCG – Discounted </a:t>
+              <a:t>Discounted </a:t>
             </a:r>
             <a:r>
               <a:rPr lang="en-US" altLang="ru-RU" sz="2400" dirty="0" smtClean="0">
@@ -11621,7 +11569,7 @@
             </a:r>
             <a:r>
               <a:rPr lang="en-US" altLang="ru-RU" dirty="0" err="1" smtClean="0"/>
-              <a:t>giảm</a:t>
+              <a:t>khấu</a:t>
             </a:r>
             <a:r>
               <a:rPr lang="en-US" altLang="ru-RU" dirty="0" smtClean="0"/>
@@ -11629,7 +11577,7 @@
             </a:r>
             <a:r>
               <a:rPr lang="en-US" altLang="ru-RU" dirty="0" err="1" smtClean="0"/>
-              <a:t>giá</a:t>
+              <a:t>trừ</a:t>
             </a:r>
             <a:r>
               <a:rPr lang="en-US" altLang="ru-RU" dirty="0" smtClean="0"/>
@@ -11637,7 +11585,31 @@
             </a:r>
             <a:r>
               <a:rPr lang="en-US" altLang="ru-RU" dirty="0" err="1" smtClean="0"/>
+              <a:t>giá</a:t>
+            </a:r>
+            <a:r>
+              <a:rPr lang="en-US" altLang="ru-RU" dirty="0" smtClean="0"/>
+              <a:t> </a:t>
+            </a:r>
+            <a:r>
+              <a:rPr lang="en-US" altLang="ru-RU" dirty="0" err="1" smtClean="0"/>
               <a:t>trị</a:t>
+            </a:r>
+            <a:r>
+              <a:rPr lang="en-US" altLang="ru-RU" dirty="0" smtClean="0"/>
+              <a:t> </a:t>
+            </a:r>
+            <a:r>
+              <a:rPr lang="en-US" altLang="ru-RU" dirty="0" err="1" smtClean="0"/>
+              <a:t>lợi</a:t>
+            </a:r>
+            <a:r>
+              <a:rPr lang="en-US" altLang="ru-RU" dirty="0" smtClean="0"/>
+              <a:t> </a:t>
+            </a:r>
+            <a:r>
+              <a:rPr lang="en-US" altLang="ru-RU" dirty="0" err="1" smtClean="0"/>
+              <a:t>ích</a:t>
             </a:r>
             <a:r>
               <a:rPr lang="en-US" altLang="ru-RU" dirty="0" smtClean="0"/>
@@ -12060,23 +12032,7 @@
                   <a:schemeClr val="tx2"/>
                 </a:solidFill>
               </a:rPr>
-              <a:t>mức</a:t>
-            </a:r>
-            <a:r>
-              <a:rPr lang="en-US" altLang="ru-RU" sz="3600" dirty="0" smtClean="0">
-                <a:solidFill>
-                  <a:schemeClr val="tx2"/>
-                </a:solidFill>
-              </a:rPr>
-              <a:t> </a:t>
-            </a:r>
-            <a:r>
-              <a:rPr lang="en-US" altLang="ru-RU" sz="3600" dirty="0" err="1" smtClean="0">
-                <a:solidFill>
-                  <a:schemeClr val="tx2"/>
-                </a:solidFill>
-              </a:rPr>
-              <a:t>hữu</a:t>
+              <a:t>lợi</a:t>
             </a:r>
             <a:r>
               <a:rPr lang="en-US" altLang="ru-RU" sz="3600" dirty="0" smtClean="0">
@@ -12905,360 +12861,29 @@
           <a:p>
             <a:pPr algn="just" eaLnBrk="1" hangingPunct="1"/>
             <a:r>
-              <a:rPr lang="en-US" altLang="ru-RU" dirty="0" smtClean="0"/>
-              <a:t>NDCG: </a:t>
-            </a:r>
-            <a:r>
-              <a:rPr lang="en-US" altLang="ru-RU" dirty="0" err="1" smtClean="0"/>
-              <a:t>là</a:t>
-            </a:r>
-            <a:r>
-              <a:rPr lang="en-US" altLang="ru-RU" dirty="0" smtClean="0"/>
-              <a:t> </a:t>
-            </a:r>
-            <a:r>
-              <a:rPr lang="en-US" altLang="ru-RU" dirty="0" err="1" smtClean="0"/>
-              <a:t>giá</a:t>
-            </a:r>
-            <a:r>
-              <a:rPr lang="en-US" altLang="ru-RU" dirty="0" smtClean="0"/>
-              <a:t> </a:t>
-            </a:r>
-            <a:r>
-              <a:rPr lang="en-US" altLang="ru-RU" dirty="0" err="1" smtClean="0"/>
-              <a:t>trị</a:t>
-            </a:r>
-            <a:r>
-              <a:rPr lang="en-US" altLang="ru-RU" dirty="0" smtClean="0"/>
-              <a:t> </a:t>
-            </a:r>
-            <a:r>
-              <a:rPr lang="en-US" altLang="ru-RU" dirty="0" err="1" smtClean="0"/>
-              <a:t>chuẩn</a:t>
-            </a:r>
-            <a:r>
-              <a:rPr lang="en-US" altLang="ru-RU" dirty="0" smtClean="0"/>
-              <a:t> </a:t>
-            </a:r>
-            <a:r>
-              <a:rPr lang="en-US" altLang="ru-RU" dirty="0" err="1" smtClean="0"/>
-              <a:t>hóa</a:t>
-            </a:r>
-            <a:r>
-              <a:rPr lang="en-US" altLang="ru-RU" dirty="0" smtClean="0"/>
-              <a:t> DCG </a:t>
-            </a:r>
-            <a:r>
-              <a:rPr lang="en-US" altLang="ru-RU" dirty="0" err="1" smtClean="0"/>
-              <a:t>bằng</a:t>
-            </a:r>
-            <a:r>
-              <a:rPr lang="en-US" altLang="ru-RU" dirty="0" smtClean="0"/>
-              <a:t> </a:t>
-            </a:r>
-            <a:r>
-              <a:rPr lang="en-US" altLang="ru-RU" dirty="0" err="1" smtClean="0"/>
-              <a:t>cách</a:t>
-            </a:r>
-            <a:r>
-              <a:rPr lang="en-US" altLang="ru-RU" dirty="0" smtClean="0"/>
-              <a:t> chia </a:t>
-            </a:r>
-            <a:r>
-              <a:rPr lang="en-US" altLang="ru-RU" dirty="0" err="1" smtClean="0"/>
-              <a:t>cho</a:t>
-            </a:r>
-            <a:r>
-              <a:rPr lang="en-US" altLang="ru-RU" dirty="0" smtClean="0"/>
-              <a:t> DCG </a:t>
-            </a:r>
-            <a:r>
-              <a:rPr lang="en-US" altLang="ru-RU" dirty="0" err="1" smtClean="0"/>
-              <a:t>của</a:t>
-            </a:r>
-            <a:r>
-              <a:rPr lang="en-US" altLang="ru-RU" dirty="0" smtClean="0"/>
-              <a:t> </a:t>
-            </a:r>
-            <a:r>
-              <a:rPr lang="en-US" altLang="ru-RU" dirty="0" err="1" smtClean="0"/>
-              <a:t>xếp</a:t>
-            </a:r>
-            <a:r>
-              <a:rPr lang="en-US" altLang="ru-RU" dirty="0" smtClean="0"/>
-              <a:t> </a:t>
-            </a:r>
-            <a:r>
-              <a:rPr lang="en-US" altLang="ru-RU" dirty="0" err="1" smtClean="0"/>
-              <a:t>hạng</a:t>
-            </a:r>
-            <a:r>
-              <a:rPr lang="en-US" altLang="ru-RU" dirty="0" smtClean="0"/>
-              <a:t> </a:t>
-            </a:r>
-            <a:r>
-              <a:rPr lang="en-US" altLang="ru-RU" dirty="0" err="1" smtClean="0"/>
-              <a:t>mẫu</a:t>
-            </a:r>
-            <a:r>
-              <a:rPr lang="en-US" altLang="ru-RU" dirty="0" smtClean="0"/>
-              <a:t>.</a:t>
+              <a:rPr lang="vi-VN" altLang="ru-RU" dirty="0" smtClean="0"/>
+              <a:t>NDCG: là giá trị chuẩn hóa bằng cách chia DCG của tập kết quả cho DCG của xếp hạng mẫu.</a:t>
             </a:r>
           </a:p>
           <a:p>
             <a:pPr lvl="1" algn="just" eaLnBrk="1" hangingPunct="1"/>
             <a:r>
-              <a:rPr lang="en-US" altLang="ru-RU" dirty="0" err="1" smtClean="0"/>
-              <a:t>Xếp</a:t>
-            </a:r>
-            <a:r>
-              <a:rPr lang="en-US" altLang="ru-RU" dirty="0" smtClean="0"/>
-              <a:t> </a:t>
-            </a:r>
-            <a:r>
-              <a:rPr lang="en-US" altLang="ru-RU" dirty="0" err="1" smtClean="0"/>
-              <a:t>hạng</a:t>
-            </a:r>
-            <a:r>
-              <a:rPr lang="en-US" altLang="ru-RU" dirty="0" smtClean="0"/>
-              <a:t> </a:t>
-            </a:r>
-            <a:r>
-              <a:rPr lang="en-US" altLang="ru-RU" dirty="0" err="1" smtClean="0"/>
-              <a:t>mẫu</a:t>
-            </a:r>
-            <a:r>
-              <a:rPr lang="en-US" altLang="ru-RU" dirty="0" smtClean="0"/>
-              <a:t> </a:t>
-            </a:r>
-            <a:r>
-              <a:rPr lang="en-US" altLang="ru-RU" dirty="0" err="1" smtClean="0"/>
-              <a:t>là</a:t>
-            </a:r>
-            <a:r>
-              <a:rPr lang="en-US" altLang="ru-RU" dirty="0" smtClean="0"/>
-              <a:t> </a:t>
-            </a:r>
-            <a:r>
-              <a:rPr lang="en-US" altLang="ru-RU" dirty="0" err="1" smtClean="0"/>
-              <a:t>thứ</a:t>
-            </a:r>
-            <a:r>
-              <a:rPr lang="en-US" altLang="ru-RU" dirty="0" smtClean="0"/>
-              <a:t> </a:t>
-            </a:r>
-            <a:r>
-              <a:rPr lang="en-US" altLang="ru-RU" dirty="0" err="1" smtClean="0"/>
-              <a:t>tự</a:t>
-            </a:r>
-            <a:r>
-              <a:rPr lang="en-US" altLang="ru-RU" dirty="0" smtClean="0"/>
-              <a:t> </a:t>
-            </a:r>
-            <a:r>
-              <a:rPr lang="en-US" altLang="ru-RU" dirty="0" err="1" smtClean="0"/>
-              <a:t>giảm</a:t>
-            </a:r>
-            <a:r>
-              <a:rPr lang="en-US" altLang="ru-RU" dirty="0" smtClean="0"/>
-              <a:t> </a:t>
-            </a:r>
-            <a:r>
-              <a:rPr lang="en-US" altLang="ru-RU" dirty="0" err="1" smtClean="0"/>
-              <a:t>dần</a:t>
-            </a:r>
-            <a:r>
-              <a:rPr lang="en-US" altLang="ru-RU" dirty="0" smtClean="0"/>
-              <a:t> </a:t>
-            </a:r>
-            <a:r>
-              <a:rPr lang="en-US" altLang="ru-RU" dirty="0" err="1" smtClean="0"/>
-              <a:t>mức</a:t>
-            </a:r>
-            <a:r>
-              <a:rPr lang="en-US" altLang="ru-RU" dirty="0" smtClean="0"/>
-              <a:t> </a:t>
-            </a:r>
-            <a:r>
-              <a:rPr lang="en-US" altLang="ru-RU" dirty="0" err="1" smtClean="0"/>
-              <a:t>phù</a:t>
-            </a:r>
-            <a:r>
-              <a:rPr lang="en-US" altLang="ru-RU" dirty="0" smtClean="0"/>
-              <a:t> </a:t>
-            </a:r>
-            <a:r>
-              <a:rPr lang="en-US" altLang="ru-RU" dirty="0" err="1" smtClean="0"/>
-              <a:t>hợp</a:t>
-            </a:r>
-            <a:r>
-              <a:rPr lang="en-US" altLang="ru-RU" dirty="0" smtClean="0"/>
-              <a:t>.</a:t>
-            </a:r>
+              <a:rPr lang="vi-VN" altLang="ru-RU" dirty="0" smtClean="0"/>
+              <a:t>Xếp hạng mẫu là thứ tự giảm dần mức phù hợp của văn bản</a:t>
+            </a:r>
+            <a:r>
+              <a:rPr lang="vi-VN" altLang="ru-RU" dirty="0" smtClean="0"/>
+              <a:t>;</a:t>
+            </a:r>
+            <a:endParaRPr lang="vi-VN" altLang="ru-RU" dirty="0" smtClean="0"/>
           </a:p>
           <a:p>
             <a:pPr lvl="1" algn="just" eaLnBrk="1" hangingPunct="1"/>
             <a:r>
-              <a:rPr lang="en-US" altLang="ru-RU" dirty="0" err="1" smtClean="0"/>
-              <a:t>Giá</a:t>
-            </a:r>
-            <a:r>
-              <a:rPr lang="en-US" altLang="ru-RU" dirty="0" smtClean="0"/>
-              <a:t> </a:t>
-            </a:r>
-            <a:r>
-              <a:rPr lang="en-US" altLang="ru-RU" dirty="0" err="1" smtClean="0"/>
-              <a:t>trị</a:t>
-            </a:r>
-            <a:r>
-              <a:rPr lang="en-US" altLang="ru-RU" dirty="0" smtClean="0"/>
-              <a:t> </a:t>
-            </a:r>
-            <a:r>
-              <a:rPr lang="en-US" altLang="ru-RU" dirty="0" err="1" smtClean="0"/>
-              <a:t>chuẩn</a:t>
-            </a:r>
-            <a:r>
-              <a:rPr lang="en-US" altLang="ru-RU" dirty="0" smtClean="0"/>
-              <a:t> </a:t>
-            </a:r>
-            <a:r>
-              <a:rPr lang="en-US" altLang="ru-RU" dirty="0" err="1" smtClean="0"/>
-              <a:t>hóa</a:t>
-            </a:r>
-            <a:r>
-              <a:rPr lang="en-US" altLang="ru-RU" dirty="0" smtClean="0"/>
-              <a:t> </a:t>
-            </a:r>
-            <a:r>
-              <a:rPr lang="en-US" altLang="ru-RU" dirty="0" err="1" smtClean="0"/>
-              <a:t>thích</a:t>
-            </a:r>
-            <a:r>
-              <a:rPr lang="en-US" altLang="ru-RU" dirty="0" smtClean="0"/>
-              <a:t> </a:t>
-            </a:r>
-            <a:r>
-              <a:rPr lang="en-US" altLang="ru-RU" dirty="0" err="1" smtClean="0"/>
-              <a:t>hợp</a:t>
-            </a:r>
-            <a:r>
-              <a:rPr lang="en-US" altLang="ru-RU" dirty="0" smtClean="0"/>
-              <a:t> </a:t>
-            </a:r>
-            <a:r>
-              <a:rPr lang="en-US" altLang="ru-RU" dirty="0" err="1" smtClean="0"/>
-              <a:t>để</a:t>
-            </a:r>
-            <a:r>
-              <a:rPr lang="en-US" altLang="ru-RU" dirty="0" smtClean="0"/>
-              <a:t> so </a:t>
-            </a:r>
-            <a:r>
-              <a:rPr lang="en-US" altLang="ru-RU" dirty="0" err="1" smtClean="0"/>
-              <a:t>sánh</a:t>
-            </a:r>
-            <a:r>
-              <a:rPr lang="en-US" altLang="ru-RU" dirty="0" smtClean="0"/>
-              <a:t> </a:t>
-            </a:r>
-            <a:r>
-              <a:rPr lang="en-US" altLang="ru-RU" dirty="0" err="1" smtClean="0"/>
-              <a:t>những</a:t>
-            </a:r>
-            <a:r>
-              <a:rPr lang="en-US" altLang="ru-RU" dirty="0" smtClean="0"/>
-              <a:t> </a:t>
-            </a:r>
-            <a:r>
-              <a:rPr lang="en-US" altLang="ru-RU" dirty="0" err="1" smtClean="0"/>
-              <a:t>xếp</a:t>
-            </a:r>
-            <a:r>
-              <a:rPr lang="en-US" altLang="ru-RU" dirty="0" smtClean="0"/>
-              <a:t> </a:t>
-            </a:r>
-            <a:r>
-              <a:rPr lang="en-US" altLang="ru-RU" dirty="0" err="1" smtClean="0"/>
-              <a:t>hạng</a:t>
-            </a:r>
-            <a:r>
-              <a:rPr lang="en-US" altLang="ru-RU" dirty="0" smtClean="0"/>
-              <a:t> </a:t>
-            </a:r>
-            <a:r>
-              <a:rPr lang="en-US" altLang="ru-RU" dirty="0" err="1" smtClean="0"/>
-              <a:t>có</a:t>
-            </a:r>
-            <a:r>
-              <a:rPr lang="en-US" altLang="ru-RU" dirty="0" smtClean="0"/>
-              <a:t> </a:t>
-            </a:r>
-            <a:r>
-              <a:rPr lang="en-US" altLang="ru-RU" dirty="0" err="1" smtClean="0"/>
-              <a:t>số</a:t>
-            </a:r>
-            <a:r>
-              <a:rPr lang="en-US" altLang="ru-RU" dirty="0" smtClean="0"/>
-              <a:t> </a:t>
-            </a:r>
-            <a:r>
-              <a:rPr lang="en-US" altLang="ru-RU" dirty="0" err="1" smtClean="0"/>
-              <a:t>lượng</a:t>
-            </a:r>
-            <a:r>
-              <a:rPr lang="en-US" altLang="ru-RU" dirty="0" smtClean="0"/>
-              <a:t> </a:t>
-            </a:r>
-            <a:r>
-              <a:rPr lang="en-US" altLang="ru-RU" dirty="0" err="1" smtClean="0"/>
-              <a:t>văn</a:t>
-            </a:r>
-            <a:r>
-              <a:rPr lang="en-US" altLang="ru-RU" dirty="0" smtClean="0"/>
-              <a:t> </a:t>
-            </a:r>
-            <a:r>
-              <a:rPr lang="en-US" altLang="ru-RU" dirty="0" err="1" smtClean="0"/>
-              <a:t>bản</a:t>
-            </a:r>
-            <a:r>
-              <a:rPr lang="en-US" altLang="ru-RU" dirty="0" smtClean="0"/>
-              <a:t> </a:t>
-            </a:r>
-            <a:r>
-              <a:rPr lang="en-US" altLang="ru-RU" dirty="0" err="1" smtClean="0"/>
-              <a:t>phù</a:t>
-            </a:r>
-            <a:r>
-              <a:rPr lang="en-US" altLang="ru-RU" dirty="0" smtClean="0"/>
-              <a:t> </a:t>
-            </a:r>
-            <a:r>
-              <a:rPr lang="en-US" altLang="ru-RU" dirty="0" err="1" smtClean="0"/>
-              <a:t>hợp</a:t>
-            </a:r>
-            <a:r>
-              <a:rPr lang="en-US" altLang="ru-RU" dirty="0" smtClean="0"/>
-              <a:t> </a:t>
-            </a:r>
-            <a:r>
-              <a:rPr lang="en-US" altLang="ru-RU" dirty="0" err="1" smtClean="0"/>
-              <a:t>khác</a:t>
-            </a:r>
-            <a:r>
-              <a:rPr lang="en-US" altLang="ru-RU" dirty="0" smtClean="0"/>
-              <a:t> </a:t>
-            </a:r>
-            <a:r>
-              <a:rPr lang="en-US" altLang="ru-RU" dirty="0" err="1" smtClean="0"/>
-              <a:t>nhau</a:t>
-            </a:r>
-            <a:r>
-              <a:rPr lang="en-US" altLang="ru-RU" dirty="0" smtClean="0"/>
-              <a:t>.</a:t>
-            </a:r>
-            <a:endParaRPr lang="en-US" altLang="ru-RU" sz="2000" dirty="0" smtClean="0"/>
+              <a:rPr lang="vi-VN" altLang="ru-RU" dirty="0" smtClean="0"/>
+              <a:t>Giá trị chuẩn hóa thích hợp để so sánh những kết quả có số lượng văn bản phù hợp khác nhau.</a:t>
+            </a:r>
+            <a:endParaRPr lang="vi-VN" altLang="ru-RU" sz="2000" dirty="0" smtClean="0"/>
           </a:p>
         </p:txBody>
       </p:sp>
@@ -24291,7 +23916,7 @@
           <a:graphicData uri="http://schemas.openxmlformats.org/presentationml/2006/ole">
             <mc:AlternateContent xmlns:mc="http://schemas.openxmlformats.org/markup-compatibility/2006">
               <mc:Choice xmlns:v="urn:schemas-microsoft-com:vml" Requires="v">
-                <p:oleObj spid="_x0000_s24929" name="Equation" r:id="rId4" imgW="3009900" imgH="482600" progId="Equation.3">
+                <p:oleObj spid="_x0000_s25157" name="Equation" r:id="rId4" imgW="3009900" imgH="482600" progId="Equation.3">
                   <p:embed/>
                 </p:oleObj>
               </mc:Choice>
@@ -24374,7 +23999,7 @@
           <a:graphicData uri="http://schemas.openxmlformats.org/presentationml/2006/ole">
             <mc:AlternateContent xmlns:mc="http://schemas.openxmlformats.org/markup-compatibility/2006">
               <mc:Choice xmlns:v="urn:schemas-microsoft-com:vml" Requires="v">
-                <p:oleObj spid="_x0000_s24930" name="Equation" r:id="rId6" imgW="3035300" imgH="482600" progId="Equation.3">
+                <p:oleObj spid="_x0000_s25158" name="Equation" r:id="rId6" imgW="3035300" imgH="482600" progId="Equation.3">
                   <p:embed/>
                 </p:oleObj>
               </mc:Choice>
@@ -24457,7 +24082,7 @@
           <a:graphicData uri="http://schemas.openxmlformats.org/presentationml/2006/ole">
             <mc:AlternateContent xmlns:mc="http://schemas.openxmlformats.org/markup-compatibility/2006">
               <mc:Choice xmlns:v="urn:schemas-microsoft-com:vml" Requires="v">
-                <p:oleObj spid="_x0000_s24931" name="Equation" r:id="rId8" imgW="3048000" imgH="482600" progId="Equation.3">
+                <p:oleObj spid="_x0000_s25159" name="Equation" r:id="rId8" imgW="3048000" imgH="482600" progId="Equation.3">
                   <p:embed/>
                 </p:oleObj>
               </mc:Choice>
@@ -24540,7 +24165,7 @@
           <a:graphicData uri="http://schemas.openxmlformats.org/presentationml/2006/ole">
             <mc:AlternateContent xmlns:mc="http://schemas.openxmlformats.org/markup-compatibility/2006">
               <mc:Choice xmlns:v="urn:schemas-microsoft-com:vml" Requires="v">
-                <p:oleObj spid="_x0000_s24932" name="Equation" r:id="rId10" imgW="1841500" imgH="228600" progId="Equation.3">
+                <p:oleObj spid="_x0000_s25160" name="Equation" r:id="rId10" imgW="1841500" imgH="228600" progId="Equation.3">
                   <p:embed/>
                 </p:oleObj>
               </mc:Choice>
@@ -25227,58 +24852,10 @@
               <a:t>3. </a:t>
             </a:r>
             <a:r>
-              <a:rPr lang="en-US" sz="2800" dirty="0" err="1" smtClean="0"/>
-              <a:t>Xây</a:t>
-            </a:r>
-            <a:r>
-              <a:rPr lang="en-US" sz="2800" dirty="0" smtClean="0"/>
-              <a:t> </a:t>
-            </a:r>
-            <a:r>
-              <a:rPr lang="en-US" sz="2800" dirty="0" err="1" smtClean="0"/>
-              <a:t>dựng</a:t>
-            </a:r>
-            <a:r>
-              <a:rPr lang="en-US" sz="2800" dirty="0" smtClean="0"/>
-              <a:t> </a:t>
-            </a:r>
-            <a:r>
-              <a:rPr lang="en-US" sz="2800" dirty="0" err="1" smtClean="0"/>
-              <a:t>bộ</a:t>
-            </a:r>
-            <a:r>
-              <a:rPr lang="en-US" sz="2800" dirty="0" smtClean="0"/>
-              <a:t> </a:t>
-            </a:r>
-            <a:r>
-              <a:rPr lang="en-US" sz="2800" dirty="0" err="1" smtClean="0"/>
-              <a:t>dữ</a:t>
-            </a:r>
-            <a:r>
-              <a:rPr lang="en-US" sz="2800" dirty="0" smtClean="0"/>
-              <a:t> </a:t>
-            </a:r>
-            <a:r>
-              <a:rPr lang="en-US" sz="2800" dirty="0" err="1" smtClean="0"/>
-              <a:t>liệu</a:t>
-            </a:r>
-            <a:r>
-              <a:rPr lang="en-US" sz="2800" dirty="0" smtClean="0"/>
-              <a:t> </a:t>
-            </a:r>
-            <a:r>
-              <a:rPr lang="en-US" sz="2800" dirty="0" err="1" smtClean="0"/>
-              <a:t>kiểm</a:t>
-            </a:r>
-            <a:r>
-              <a:rPr lang="en-US" sz="2800" dirty="0" smtClean="0"/>
-              <a:t> </a:t>
-            </a:r>
-            <a:r>
-              <a:rPr lang="en-US" sz="2800" dirty="0" err="1" smtClean="0"/>
-              <a:t>thử</a:t>
-            </a:r>
-            <a:endParaRPr lang="en-US" sz="2800" dirty="0" smtClean="0"/>
+              <a:rPr lang="vi-VN" sz="2800" dirty="0" smtClean="0"/>
+              <a:t>Xây dựng bộ dữ liệu kiểm thử</a:t>
+            </a:r>
+            <a:endParaRPr lang="vi-VN" sz="2800" dirty="0" smtClean="0"/>
           </a:p>
         </p:txBody>
       </p:sp>
@@ -25549,10 +25126,42 @@
           <a:p>
             <a:pPr eaLnBrk="1" hangingPunct="1"/>
             <a:r>
-              <a:rPr lang="en-US" altLang="ru-RU" smtClean="0"/>
-              <a:t>Xác định các văn bản phù hợp</a:t>
-            </a:r>
-            <a:endParaRPr lang="vi-VN" altLang="ru-RU" smtClean="0"/>
+              <a:rPr lang="en-US" altLang="ru-RU" dirty="0" err="1" smtClean="0"/>
+              <a:t>Đánh</a:t>
+            </a:r>
+            <a:r>
+              <a:rPr lang="en-US" altLang="ru-RU" dirty="0" smtClean="0"/>
+              <a:t> </a:t>
+            </a:r>
+            <a:r>
+              <a:rPr lang="en-US" altLang="ru-RU" dirty="0" err="1" smtClean="0"/>
+              <a:t>giá</a:t>
+            </a:r>
+            <a:r>
+              <a:rPr lang="en-US" altLang="ru-RU" dirty="0" smtClean="0"/>
+              <a:t> </a:t>
+            </a:r>
+            <a:r>
+              <a:rPr lang="en-US" altLang="ru-RU" dirty="0" err="1" smtClean="0"/>
+              <a:t>tính</a:t>
+            </a:r>
+            <a:r>
+              <a:rPr lang="en-US" altLang="ru-RU" dirty="0" smtClean="0"/>
+              <a:t> </a:t>
+            </a:r>
+            <a:r>
+              <a:rPr lang="en-US" altLang="ru-RU" dirty="0" err="1" smtClean="0"/>
+              <a:t>phù</a:t>
+            </a:r>
+            <a:r>
+              <a:rPr lang="en-US" altLang="ru-RU" dirty="0" smtClean="0"/>
+              <a:t> </a:t>
+            </a:r>
+            <a:r>
+              <a:rPr lang="en-US" altLang="ru-RU" dirty="0" err="1" smtClean="0"/>
+              <a:t>hợp</a:t>
+            </a:r>
+            <a:endParaRPr lang="vi-VN" altLang="ru-RU" dirty="0" smtClean="0"/>
           </a:p>
         </p:txBody>
       </p:sp>
@@ -25578,7 +25187,7 @@
           <a:p>
             <a:pPr algn="just" eaLnBrk="1" hangingPunct="1"/>
             <a:r>
-              <a:rPr lang="vi-VN" altLang="ru-RU" dirty="0" smtClean="0"/>
+              <a:rPr lang="vi-VN" altLang="ru-RU" dirty="0"/>
               <a:t>Sự phù hợp là rất trừu tượng</a:t>
             </a:r>
           </a:p>
@@ -27370,45 +26979,45 @@
             <a:off x="611560" y="2017713"/>
             <a:ext cx="8343528" cy="2132012"/>
           </a:xfrm>
+          <a:noFill/>
+          <a:ln>
+            <a:noFill/>
+          </a:ln>
+          <a:effectLst/>
+          <a:extLst>
+            <a:ext uri="{AF507438-7753-43E0-B8FC-AC1667EBCBE1}">
+              <a14:hiddenEffects xmlns:a14="http://schemas.microsoft.com/office/drawing/2010/main">
+                <a:effectLst>
+                  <a:outerShdw dist="35921" dir="2700000" algn="ctr" rotWithShape="0">
+                    <a:schemeClr val="bg2"/>
+                  </a:outerShdw>
+                </a:effectLst>
+              </a14:hiddenEffects>
+            </a:ext>
+          </a:extLst>
         </p:spPr>
         <p:txBody>
-          <a:bodyPr/>
+          <a:bodyPr vert="horz" wrap="square" lIns="91440" tIns="45720" rIns="91440" bIns="45720" numCol="1" anchor="t" anchorCtr="0" compatLnSpc="1">
+            <a:prstTxWarp prst="textNoShape">
+              <a:avLst/>
+            </a:prstTxWarp>
+          </a:bodyPr>
           <a:lstStyle/>
           <a:p>
-            <a:pPr algn="just" eaLnBrk="1" hangingPunct="1">
-              <a:spcBef>
-                <a:spcPts val="700"/>
-              </a:spcBef>
-              <a:buClr>
-                <a:srgbClr val="336699"/>
-              </a:buClr>
-              <a:buSzTx/>
-              <a:buFont typeface="Wingdings" panose="05000000000000000000" pitchFamily="2" charset="2"/>
-              <a:buChar char="§"/>
-            </a:pPr>
-            <a:r>
-              <a:rPr lang="vi-VN" altLang="ru-RU" dirty="0" smtClean="0"/>
+            <a:pPr algn="just" eaLnBrk="1" hangingPunct="1"/>
+            <a:r>
+              <a:rPr lang="vi-VN" altLang="ru-RU" dirty="0"/>
               <a:t>Kết quả thu được bởi các thành viên có thể được sử dụng để đánh giá kết quả tìm kiếm nếu đảm bảo tính thống nhất trên một ngưỡng xác định</a:t>
             </a:r>
           </a:p>
           <a:p>
-            <a:pPr algn="just" eaLnBrk="1" hangingPunct="1">
-              <a:spcBef>
-                <a:spcPts val="700"/>
-              </a:spcBef>
-              <a:buClr>
-                <a:srgbClr val="336699"/>
-              </a:buClr>
-              <a:buSzTx/>
-              <a:buFont typeface="Wingdings" panose="05000000000000000000" pitchFamily="2" charset="2"/>
-              <a:buChar char="§"/>
-            </a:pPr>
-            <a:r>
-              <a:rPr lang="vi-VN" altLang="ru-RU" dirty="0" smtClean="0"/>
+            <a:pPr algn="just" eaLnBrk="1" hangingPunct="1"/>
+            <a:r>
+              <a:rPr lang="vi-VN" altLang="ru-RU" dirty="0"/>
               <a:t>Đo sự thống nhất bằng cách nào</a:t>
             </a:r>
             <a:r>
-              <a:rPr lang="de-DE" altLang="ru-RU" dirty="0" smtClean="0"/>
+              <a:rPr lang="de-DE" altLang="ru-RU" dirty="0"/>
               <a:t>?</a:t>
             </a:r>
           </a:p>
@@ -34320,11 +33929,7 @@
           <a:p>
             <a:r>
               <a:rPr lang="en-US" altLang="ru-RU" smtClean="0"/>
-              <a:t>Bài </a:t>
-            </a:r>
-            <a:r>
-              <a:rPr lang="en-US" altLang="ru-RU" smtClean="0"/>
-              <a:t>tập 8.1</a:t>
+              <a:t>Bài tập 8.1</a:t>
             </a:r>
             <a:endParaRPr lang="vi-VN" altLang="ru-RU" smtClean="0"/>
           </a:p>
@@ -35059,11 +34664,7 @@
             </a:r>
             <a:r>
               <a:rPr lang="en-US" altLang="ru-RU" smtClean="0"/>
-              <a:t> </a:t>
-            </a:r>
-            <a:r>
-              <a:rPr lang="en-US" altLang="ru-RU" smtClean="0"/>
-              <a:t>8.2</a:t>
+              <a:t> 8.2</a:t>
             </a:r>
             <a:endParaRPr lang="vi-VN" altLang="ru-RU" dirty="0" smtClean="0"/>
           </a:p>
@@ -35273,7 +34874,7 @@
             </a:lvl9pPr>
           </a:lstStyle>
           <a:p>
-            <a:pPr eaLnBrk="1" hangingPunct="1">
+            <a:pPr marL="0" indent="0" eaLnBrk="1" hangingPunct="1">
               <a:spcBef>
                 <a:spcPts val="700"/>
               </a:spcBef>
@@ -35281,8 +34882,7 @@
                 <a:srgbClr val="336699"/>
               </a:buClr>
               <a:buSzTx/>
-              <a:buFont typeface="Wingdings" panose="05000000000000000000" pitchFamily="2" charset="2"/>
-              <a:buChar char="§"/>
+              <a:buNone/>
               <a:defRPr/>
             </a:pPr>
             <a:r>
@@ -35291,7 +34891,7 @@
             </a:r>
           </a:p>
           <a:p>
-            <a:pPr eaLnBrk="1" hangingPunct="1">
+            <a:pPr marL="0" indent="0" eaLnBrk="1" hangingPunct="1">
               <a:spcBef>
                 <a:spcPts val="700"/>
               </a:spcBef>
@@ -35299,8 +34899,7 @@
                 <a:srgbClr val="336699"/>
               </a:buClr>
               <a:buSzTx/>
-              <a:buFont typeface="Wingdings" panose="05000000000000000000" pitchFamily="2" charset="2"/>
-              <a:buChar char="§"/>
+              <a:buNone/>
               <a:defRPr/>
             </a:pPr>
             <a:r>
@@ -35309,7 +34908,7 @@
             </a:r>
           </a:p>
           <a:p>
-            <a:pPr eaLnBrk="1" hangingPunct="1">
+            <a:pPr marL="0" indent="0" eaLnBrk="1" hangingPunct="1">
               <a:spcBef>
                 <a:spcPts val="700"/>
               </a:spcBef>
@@ -35317,8 +34916,7 @@
                 <a:srgbClr val="336699"/>
               </a:buClr>
               <a:buSzTx/>
-              <a:buFont typeface="Wingdings" panose="05000000000000000000" pitchFamily="2" charset="2"/>
-              <a:buChar char="§"/>
+              <a:buNone/>
               <a:defRPr/>
             </a:pPr>
             <a:r>
@@ -35327,7 +34925,7 @@
             </a:r>
           </a:p>
           <a:p>
-            <a:pPr eaLnBrk="1" hangingPunct="1">
+            <a:pPr marL="0" indent="0" eaLnBrk="1" hangingPunct="1">
               <a:spcBef>
                 <a:spcPts val="700"/>
               </a:spcBef>
@@ -35335,8 +34933,7 @@
                 <a:srgbClr val="336699"/>
               </a:buClr>
               <a:buSzTx/>
-              <a:buFont typeface="Wingdings" panose="05000000000000000000" pitchFamily="2" charset="2"/>
-              <a:buChar char="§"/>
+              <a:buNone/>
               <a:defRPr/>
             </a:pPr>
             <a:r>
@@ -36329,12 +35926,108 @@
           <a:p>
             <a:pPr algn="just" eaLnBrk="1" hangingPunct="1"/>
             <a:r>
+              <a:rPr lang="vi-VN" altLang="ru-RU" dirty="0"/>
+              <a:t>MRR đánh giá cao kết quả phù hợp gần với vị trí đầu danh sách.</a:t>
+            </a:r>
+            <a:endParaRPr lang="en-US" altLang="ru-RU" dirty="0" smtClean="0"/>
+          </a:p>
+          <a:p>
+            <a:pPr algn="just" eaLnBrk="1" hangingPunct="1"/>
+            <a:r>
               <a:rPr lang="en-US" altLang="ru-RU" dirty="0" smtClean="0"/>
               <a:t>MRR </a:t>
             </a:r>
             <a:r>
               <a:rPr lang="vi-VN" altLang="ru-RU" dirty="0" smtClean="0"/>
-              <a:t>thường được sử dụng trong kịch bản tìm kiếm một văn bản phù hợp: </a:t>
+              <a:t>thường được sử dụng </a:t>
+            </a:r>
+            <a:r>
+              <a:rPr lang="en-US" altLang="ru-RU" dirty="0" err="1" smtClean="0"/>
+              <a:t>để</a:t>
+            </a:r>
+            <a:r>
+              <a:rPr lang="en-US" altLang="ru-RU" dirty="0" smtClean="0"/>
+              <a:t> </a:t>
+            </a:r>
+            <a:r>
+              <a:rPr lang="en-US" altLang="ru-RU" dirty="0" err="1" smtClean="0"/>
+              <a:t>đánh</a:t>
+            </a:r>
+            <a:r>
+              <a:rPr lang="en-US" altLang="ru-RU" dirty="0" smtClean="0"/>
+              <a:t> </a:t>
+            </a:r>
+            <a:r>
+              <a:rPr lang="en-US" altLang="ru-RU" dirty="0" err="1" smtClean="0"/>
+              <a:t>giá</a:t>
+            </a:r>
+            <a:r>
+              <a:rPr lang="en-US" altLang="ru-RU" dirty="0" smtClean="0"/>
+              <a:t> </a:t>
+            </a:r>
+            <a:r>
+              <a:rPr lang="en-US" altLang="ru-RU" dirty="0" err="1" smtClean="0"/>
+              <a:t>kết</a:t>
+            </a:r>
+            <a:r>
+              <a:rPr lang="en-US" altLang="ru-RU" dirty="0" smtClean="0"/>
+              <a:t> </a:t>
+            </a:r>
+            <a:r>
+              <a:rPr lang="en-US" altLang="ru-RU" dirty="0" err="1" smtClean="0"/>
+              <a:t>quả</a:t>
+            </a:r>
+            <a:r>
+              <a:rPr lang="en-US" altLang="ru-RU" dirty="0" smtClean="0"/>
+              <a:t> </a:t>
+            </a:r>
+            <a:r>
+              <a:rPr lang="en-US" altLang="ru-RU" dirty="0" err="1" smtClean="0"/>
+              <a:t>tìm</a:t>
+            </a:r>
+            <a:r>
+              <a:rPr lang="en-US" altLang="ru-RU" dirty="0" smtClean="0"/>
+              <a:t> </a:t>
+            </a:r>
+            <a:r>
+              <a:rPr lang="en-US" altLang="ru-RU" dirty="0" err="1" smtClean="0"/>
+              <a:t>kiếm</a:t>
+            </a:r>
+            <a:r>
+              <a:rPr lang="en-US" altLang="ru-RU" dirty="0" smtClean="0"/>
+              <a:t> </a:t>
+            </a:r>
+            <a:r>
+              <a:rPr lang="en-US" altLang="ru-RU" dirty="0" err="1" smtClean="0"/>
+              <a:t>khi</a:t>
+            </a:r>
+            <a:r>
+              <a:rPr lang="en-US" altLang="ru-RU" dirty="0" smtClean="0"/>
+              <a:t> </a:t>
+            </a:r>
+            <a:r>
+              <a:rPr lang="en-US" altLang="ru-RU" dirty="0" err="1" smtClean="0"/>
+              <a:t>chỉ</a:t>
+            </a:r>
+            <a:r>
+              <a:rPr lang="en-US" altLang="ru-RU" dirty="0" smtClean="0"/>
+              <a:t> </a:t>
+            </a:r>
+            <a:r>
+              <a:rPr lang="en-US" altLang="ru-RU" dirty="0" err="1" smtClean="0"/>
+              <a:t>có</a:t>
+            </a:r>
+            <a:r>
+              <a:rPr lang="en-US" altLang="ru-RU" dirty="0" smtClean="0"/>
+              <a:t> </a:t>
+            </a:r>
+            <a:r>
+              <a:rPr lang="vi-VN" altLang="ru-RU" dirty="0" smtClean="0"/>
+              <a:t>một </a:t>
+            </a:r>
+            <a:r>
+              <a:rPr lang="vi-VN" altLang="ru-RU" dirty="0" smtClean="0"/>
+              <a:t>văn bản phù hợp: </a:t>
             </a:r>
           </a:p>
           <a:p>
@@ -36353,10 +36046,7 @@
           </a:p>
           <a:p>
             <a:pPr lvl="1" algn="just" eaLnBrk="1" hangingPunct="1"/>
-            <a:r>
-              <a:rPr lang="vi-VN" altLang="ru-RU" dirty="0" smtClean="0"/>
-              <a:t>MRR đánh giá cao kết quả phù hợp gần với vị trí đầu danh sách.</a:t>
-            </a:r>
+            <a:endParaRPr lang="vi-VN" altLang="ru-RU" dirty="0" smtClean="0"/>
           </a:p>
           <a:p>
             <a:pPr eaLnBrk="1" hangingPunct="1">
@@ -36763,7 +36453,7 @@
           <a:graphicData uri="http://schemas.openxmlformats.org/presentationml/2006/ole">
             <mc:AlternateContent xmlns:mc="http://schemas.openxmlformats.org/markup-compatibility/2006">
               <mc:Choice xmlns:v="urn:schemas-microsoft-com:vml" Requires="v">
-                <p:oleObj spid="_x0000_s8417" name="Equation" r:id="rId3" imgW="736280" imgH="393529" progId="Equation.3">
+                <p:oleObj spid="_x0000_s8588" name="Equation" r:id="rId3" imgW="736280" imgH="393529" progId="Equation.3">
                   <p:embed/>
                 </p:oleObj>
               </mc:Choice>
@@ -36848,17 +36538,23 @@
           <p:cNvGraphicFramePr>
             <a:graphicFrameLocks noChangeAspect="1"/>
           </p:cNvGraphicFramePr>
-          <p:nvPr/>
+          <p:nvPr>
+            <p:extLst>
+              <p:ext uri="{D42A27DB-BD31-4B8C-83A1-F6EECF244321}">
+                <p14:modId xmlns:p14="http://schemas.microsoft.com/office/powerpoint/2010/main" val="1013455165"/>
+              </p:ext>
+            </p:extLst>
+          </p:nvPr>
         </p:nvGraphicFramePr>
         <p:xfrm>
-          <a:off x="1128713" y="5557838"/>
+          <a:off x="1043608" y="5557838"/>
           <a:ext cx="3587750" cy="1111250"/>
         </p:xfrm>
         <a:graphic>
           <a:graphicData uri="http://schemas.openxmlformats.org/presentationml/2006/ole">
             <mc:AlternateContent xmlns:mc="http://schemas.openxmlformats.org/markup-compatibility/2006">
               <mc:Choice xmlns:v="urn:schemas-microsoft-com:vml" Requires="v">
-                <p:oleObj spid="_x0000_s8418" name="Equation" r:id="rId5" imgW="1435100" imgH="444500" progId="Equation.3">
+                <p:oleObj spid="_x0000_s8589" name="Equation" r:id="rId5" imgW="1435100" imgH="444500" progId="Equation.3">
                   <p:embed/>
                 </p:oleObj>
               </mc:Choice>
@@ -36888,7 +36584,7 @@
                     </p:blipFill>
                     <p:spPr bwMode="auto">
                       <a:xfrm>
-                        <a:off x="1128713" y="5557838"/>
+                        <a:off x="1043608" y="5557838"/>
                         <a:ext cx="3587750" cy="1111250"/>
                       </a:xfrm>
                       <a:prstGeom prst="rect">
@@ -36953,7 +36649,7 @@
           <a:graphicData uri="http://schemas.openxmlformats.org/presentationml/2006/ole">
             <mc:AlternateContent xmlns:mc="http://schemas.openxmlformats.org/markup-compatibility/2006">
               <mc:Choice xmlns:v="urn:schemas-microsoft-com:vml" Requires="v">
-                <p:oleObj spid="_x0000_s8419" name="Equation" r:id="rId7" imgW="1612900" imgH="431800" progId="Equation.3">
+                <p:oleObj spid="_x0000_s8590" name="Equation" r:id="rId7" imgW="1612900" imgH="431800" progId="Equation.3">
                   <p:embed/>
                 </p:oleObj>
               </mc:Choice>
@@ -37528,17 +37224,66 @@
           <a:p>
             <a:pPr eaLnBrk="1" hangingPunct="1"/>
             <a:r>
-              <a:rPr lang="en-US" altLang="ru-RU" sz="2600"/>
-              <a:t>Với Q là tập truy vấn:</a:t>
-            </a:r>
+              <a:rPr lang="en-US" altLang="ru-RU" sz="2600" dirty="0" err="1" smtClean="0"/>
+              <a:t>Gọi</a:t>
+            </a:r>
+            <a:r>
+              <a:rPr lang="en-US" altLang="ru-RU" sz="2600" dirty="0" smtClean="0"/>
+              <a:t> </a:t>
+            </a:r>
+            <a:r>
+              <a:rPr lang="en-US" altLang="ru-RU" sz="2600" dirty="0"/>
+              <a:t>Q </a:t>
+            </a:r>
+            <a:r>
+              <a:rPr lang="en-US" altLang="ru-RU" sz="2600" dirty="0" err="1"/>
+              <a:t>là</a:t>
+            </a:r>
+            <a:r>
+              <a:rPr lang="en-US" altLang="ru-RU" sz="2600" dirty="0"/>
+              <a:t> </a:t>
+            </a:r>
+            <a:r>
+              <a:rPr lang="en-US" altLang="ru-RU" sz="2600" dirty="0" err="1"/>
+              <a:t>tập</a:t>
+            </a:r>
+            <a:r>
+              <a:rPr lang="en-US" altLang="ru-RU" sz="2600" dirty="0"/>
+              <a:t> </a:t>
+            </a:r>
+            <a:r>
+              <a:rPr lang="en-US" altLang="ru-RU" sz="2600" dirty="0" err="1"/>
+              <a:t>truy</a:t>
+            </a:r>
+            <a:r>
+              <a:rPr lang="en-US" altLang="ru-RU" sz="2600" dirty="0"/>
+              <a:t> </a:t>
+            </a:r>
+            <a:r>
+              <a:rPr lang="en-US" altLang="ru-RU" sz="2600" dirty="0" err="1" smtClean="0"/>
+              <a:t>vấn</a:t>
+            </a:r>
+            <a:r>
+              <a:rPr lang="en-US" altLang="ru-RU" sz="2600" dirty="0" smtClean="0"/>
+              <a:t> </a:t>
+            </a:r>
+            <a:r>
+              <a:rPr lang="en-US" altLang="ru-RU" sz="2600" dirty="0" err="1" smtClean="0"/>
+              <a:t>mẫu</a:t>
+            </a:r>
+            <a:r>
+              <a:rPr lang="en-US" altLang="ru-RU" sz="2600" dirty="0" smtClean="0"/>
+              <a:t>:</a:t>
+            </a:r>
+            <a:endParaRPr lang="en-US" altLang="ru-RU" sz="2600" dirty="0"/>
           </a:p>
           <a:p>
             <a:pPr lvl="1" eaLnBrk="1" hangingPunct="1"/>
-            <a:endParaRPr lang="en-US" altLang="ru-RU"/>
+            <a:endParaRPr lang="en-US" altLang="ru-RU" dirty="0"/>
           </a:p>
           <a:p>
             <a:pPr eaLnBrk="1" hangingPunct="1"/>
-            <a:endParaRPr lang="en-US" altLang="ru-RU" sz="2600"/>
+            <a:endParaRPr lang="en-US" altLang="ru-RU" sz="2600" dirty="0"/>
           </a:p>
         </p:txBody>
       </p:sp>
@@ -38234,8 +37979,8 @@
         </p:nvSpPr>
         <p:spPr>
           <a:xfrm>
-            <a:off x="684213" y="2060575"/>
-            <a:ext cx="8002587" cy="4492625"/>
+            <a:off x="684213" y="1988841"/>
+            <a:ext cx="8002587" cy="4564360"/>
           </a:xfrm>
         </p:spPr>
         <p:txBody>
@@ -38541,12 +38286,28 @@
               <a:buNone/>
             </a:pPr>
             <a:r>
+              <a:rPr lang="en-US" altLang="ru-RU" sz="3600" dirty="0" smtClean="0">
+                <a:solidFill>
+                  <a:schemeClr val="tx2"/>
+                </a:solidFill>
+              </a:rPr>
+              <a:t>P</a:t>
+            </a:r>
+            <a:r>
               <a:rPr lang="vi-VN" altLang="ru-RU" sz="3600" dirty="0" smtClean="0">
                 <a:solidFill>
                   <a:schemeClr val="tx2"/>
                 </a:solidFill>
               </a:rPr>
-              <a:t>Sự phù hợp đa mức</a:t>
+              <a:t>hù </a:t>
+            </a:r>
+            <a:r>
+              <a:rPr lang="vi-VN" altLang="ru-RU" sz="3600" dirty="0" smtClean="0">
+                <a:solidFill>
+                  <a:schemeClr val="tx2"/>
+                </a:solidFill>
+              </a:rPr>
+              <a:t>hợp đa mức</a:t>
             </a:r>
             <a:endParaRPr lang="vi-VN" altLang="ru-RU" sz="3600" dirty="0">
               <a:solidFill>
@@ -38818,8 +38579,8 @@
         </p:nvSpPr>
         <p:spPr>
           <a:xfrm>
-            <a:off x="684213" y="2060575"/>
-            <a:ext cx="8259762" cy="3312641"/>
+            <a:off x="684213" y="1988841"/>
+            <a:ext cx="8259762" cy="3384376"/>
           </a:xfrm>
         </p:spPr>
         <p:txBody>
@@ -38835,8 +38596,40 @@
           <a:p>
             <a:pPr lvl="1" algn="just" eaLnBrk="1" hangingPunct="1"/>
             <a:r>
+              <a:rPr lang="en-US" altLang="ru-RU" dirty="0" err="1" smtClean="0"/>
+              <a:t>Được</a:t>
+            </a:r>
+            <a:r>
+              <a:rPr lang="en-US" altLang="ru-RU" dirty="0" smtClean="0"/>
+              <a:t> </a:t>
+            </a:r>
+            <a:r>
+              <a:rPr lang="en-US" altLang="ru-RU" dirty="0" err="1" smtClean="0"/>
+              <a:t>đo</a:t>
+            </a:r>
+            <a:r>
+              <a:rPr lang="en-US" altLang="ru-RU" dirty="0" smtClean="0"/>
+              <a:t> </a:t>
+            </a:r>
+            <a:r>
+              <a:rPr lang="en-US" altLang="ru-RU" dirty="0" err="1" smtClean="0"/>
+              <a:t>trên</a:t>
+            </a:r>
+            <a:r>
               <a:rPr lang="vi-VN" altLang="ru-RU" dirty="0" smtClean="0"/>
-              <a:t>Sử dụng bộ dữ liệu kiểm thử với độ phù hợp đa mức;</a:t>
+              <a:t> </a:t>
+            </a:r>
+            <a:r>
+              <a:rPr lang="vi-VN" altLang="ru-RU" dirty="0" smtClean="0"/>
+              <a:t>bộ dữ liệu kiểm thử </a:t>
+            </a:r>
+            <a:r>
+              <a:rPr lang="vi-VN" altLang="ru-RU" dirty="0" smtClean="0"/>
+              <a:t>phù </a:t>
+            </a:r>
+            <a:r>
+              <a:rPr lang="vi-VN" altLang="ru-RU" dirty="0" smtClean="0"/>
+              <a:t>hợp đa mức;</a:t>
             </a:r>
           </a:p>
           <a:p>
@@ -38849,13 +38642,82 @@
           <a:p>
             <a:pPr lvl="1" algn="just" eaLnBrk="1" hangingPunct="1"/>
             <a:r>
-              <a:rPr lang="vi-VN" altLang="ru-RU" dirty="0"/>
-              <a:t>Đ</a:t>
+              <a:rPr lang="en-US" altLang="ru-RU" dirty="0" smtClean="0"/>
+              <a:t>K</a:t>
             </a:r>
             <a:r>
               <a:rPr lang="vi-VN" altLang="ru-RU" dirty="0" smtClean="0"/>
-              <a:t>ược xây dựng dựa trên khái niệm độ hữu ích của tập kết quả.</a:t>
-            </a:r>
+              <a:t>hái </a:t>
+            </a:r>
+            <a:r>
+              <a:rPr lang="vi-VN" altLang="ru-RU" dirty="0" smtClean="0"/>
+              <a:t>niệm </a:t>
+            </a:r>
+            <a:r>
+              <a:rPr lang="en-US" altLang="ru-RU" dirty="0" err="1" smtClean="0"/>
+              <a:t>cơ</a:t>
+            </a:r>
+            <a:r>
+              <a:rPr lang="en-US" altLang="ru-RU" dirty="0" smtClean="0"/>
+              <a:t> </a:t>
+            </a:r>
+            <a:r>
+              <a:rPr lang="en-US" altLang="ru-RU" dirty="0" err="1" smtClean="0"/>
+              <a:t>bản</a:t>
+            </a:r>
+            <a:r>
+              <a:rPr lang="en-US" altLang="ru-RU" dirty="0" smtClean="0"/>
+              <a:t> </a:t>
+            </a:r>
+            <a:r>
+              <a:rPr lang="en-US" altLang="ru-RU" dirty="0" err="1" smtClean="0"/>
+              <a:t>của</a:t>
+            </a:r>
+            <a:r>
+              <a:rPr lang="en-US" altLang="ru-RU" dirty="0" smtClean="0"/>
+              <a:t> NDCG </a:t>
+            </a:r>
+            <a:r>
+              <a:rPr lang="en-US" altLang="ru-RU" dirty="0" err="1" smtClean="0"/>
+              <a:t>là</a:t>
+            </a:r>
+            <a:r>
+              <a:rPr lang="en-US" altLang="ru-RU" dirty="0" smtClean="0"/>
+              <a:t> </a:t>
+            </a:r>
+            <a:r>
+              <a:rPr lang="en-US" altLang="ru-RU" dirty="0" err="1" smtClean="0"/>
+              <a:t>khái</a:t>
+            </a:r>
+            <a:r>
+              <a:rPr lang="en-US" altLang="ru-RU" dirty="0" smtClean="0"/>
+              <a:t> </a:t>
+            </a:r>
+            <a:r>
+              <a:rPr lang="en-US" altLang="ru-RU" dirty="0" err="1" smtClean="0"/>
+              <a:t>niệm</a:t>
+            </a:r>
+            <a:r>
+              <a:rPr lang="en-US" altLang="ru-RU" dirty="0" smtClean="0"/>
+              <a:t> </a:t>
+            </a:r>
+            <a:r>
+              <a:rPr lang="en-US" altLang="ru-RU" dirty="0" err="1" smtClean="0"/>
+              <a:t>lợi</a:t>
+            </a:r>
+            <a:r>
+              <a:rPr lang="en-US" altLang="ru-RU" dirty="0" smtClean="0"/>
+              <a:t> </a:t>
+            </a:r>
+            <a:r>
+              <a:rPr lang="en-US" altLang="ru-RU" dirty="0" err="1" smtClean="0"/>
+              <a:t>ich</a:t>
+            </a:r>
+            <a:r>
+              <a:rPr lang="vi-VN" altLang="ru-RU" dirty="0" smtClean="0"/>
+              <a:t>.</a:t>
+            </a:r>
+            <a:endParaRPr lang="vi-VN" altLang="ru-RU" dirty="0" smtClean="0"/>
           </a:p>
         </p:txBody>
       </p:sp>
@@ -39045,8 +38907,8 @@
         </p:nvSpPr>
         <p:spPr>
           <a:xfrm>
-            <a:off x="611560" y="5589240"/>
-            <a:ext cx="8208912" cy="830997"/>
+            <a:off x="611560" y="4725144"/>
+            <a:ext cx="8208912" cy="1569660"/>
           </a:xfrm>
           <a:prstGeom prst="rect">
             <a:avLst/>
@@ -39061,12 +38923,229 @@
           <a:p>
             <a:pPr algn="just"/>
             <a:r>
+              <a:rPr lang="en-US" sz="2400" dirty="0" err="1" smtClean="0">
+                <a:solidFill>
+                  <a:schemeClr val="tx2"/>
+                </a:solidFill>
+              </a:rPr>
+              <a:t>Thuật</a:t>
+            </a:r>
+            <a:r>
+              <a:rPr lang="en-US" sz="2400" dirty="0" smtClean="0">
+                <a:solidFill>
+                  <a:schemeClr val="tx2"/>
+                </a:solidFill>
+              </a:rPr>
+              <a:t> </a:t>
+            </a:r>
+            <a:r>
+              <a:rPr lang="en-US" sz="2400" dirty="0" err="1" smtClean="0">
+                <a:solidFill>
+                  <a:schemeClr val="tx2"/>
+                </a:solidFill>
+              </a:rPr>
+              <a:t>ngữ</a:t>
+            </a:r>
+            <a:r>
+              <a:rPr lang="en-US" sz="2400" dirty="0" smtClean="0">
+                <a:solidFill>
+                  <a:schemeClr val="tx2"/>
+                </a:solidFill>
+              </a:rPr>
+              <a:t>: </a:t>
+            </a:r>
+          </a:p>
+          <a:p>
+            <a:pPr lvl="1" algn="just"/>
+            <a:r>
+              <a:rPr lang="en-US" sz="2400" dirty="0" smtClean="0">
+                <a:solidFill>
+                  <a:schemeClr val="tx2"/>
+                </a:solidFill>
+              </a:rPr>
+              <a:t>N: Normalized: </a:t>
+            </a:r>
+            <a:r>
+              <a:rPr lang="en-US" sz="2400" dirty="0" err="1" smtClean="0">
+                <a:solidFill>
+                  <a:schemeClr val="tx2"/>
+                </a:solidFill>
+              </a:rPr>
+              <a:t>Chuẩn</a:t>
+            </a:r>
+            <a:r>
+              <a:rPr lang="en-US" sz="2400" dirty="0" smtClean="0">
+                <a:solidFill>
+                  <a:schemeClr val="tx2"/>
+                </a:solidFill>
+              </a:rPr>
+              <a:t> </a:t>
+            </a:r>
+            <a:r>
+              <a:rPr lang="en-US" sz="2400" dirty="0" err="1" smtClean="0">
+                <a:solidFill>
+                  <a:schemeClr val="tx2"/>
+                </a:solidFill>
+              </a:rPr>
+              <a:t>hóa</a:t>
+            </a:r>
+            <a:r>
+              <a:rPr lang="en-US" sz="2400" dirty="0" smtClean="0">
+                <a:solidFill>
+                  <a:schemeClr val="tx2"/>
+                </a:solidFill>
+              </a:rPr>
+              <a:t>; D</a:t>
+            </a:r>
+            <a:r>
               <a:rPr lang="vi-VN" sz="2400" dirty="0" smtClean="0">
                 <a:solidFill>
                   <a:schemeClr val="tx2"/>
                 </a:solidFill>
               </a:rPr>
-              <a:t>Giá trị chuẩn hóa của tổng mức hữu ích thuyên giảm: NDCG: </a:t>
+              <a:t>: </a:t>
+            </a:r>
+            <a:r>
+              <a:rPr lang="en-US" sz="2400" dirty="0" smtClean="0">
+                <a:solidFill>
+                  <a:schemeClr val="tx2"/>
+                </a:solidFill>
+              </a:rPr>
+              <a:t>Discounted: </a:t>
+            </a:r>
+            <a:r>
+              <a:rPr lang="en-US" sz="2400" dirty="0" err="1" smtClean="0">
+                <a:solidFill>
+                  <a:schemeClr val="tx2"/>
+                </a:solidFill>
+              </a:rPr>
+              <a:t>cắt</a:t>
+            </a:r>
+            <a:r>
+              <a:rPr lang="en-US" sz="2400" dirty="0" smtClean="0">
+                <a:solidFill>
+                  <a:schemeClr val="tx2"/>
+                </a:solidFill>
+              </a:rPr>
+              <a:t> </a:t>
+            </a:r>
+            <a:r>
+              <a:rPr lang="en-US" sz="2400" dirty="0" err="1" smtClean="0">
+                <a:solidFill>
+                  <a:schemeClr val="tx2"/>
+                </a:solidFill>
+              </a:rPr>
+              <a:t>giảm</a:t>
+            </a:r>
+            <a:r>
+              <a:rPr lang="en-US" sz="2400" dirty="0" smtClean="0">
+                <a:solidFill>
+                  <a:schemeClr val="tx2"/>
+                </a:solidFill>
+              </a:rPr>
+              <a:t>; </a:t>
+            </a:r>
+          </a:p>
+          <a:p>
+            <a:pPr lvl="1" algn="just"/>
+            <a:r>
+              <a:rPr lang="en-US" sz="2400" dirty="0" smtClean="0">
+                <a:solidFill>
+                  <a:schemeClr val="tx2"/>
+                </a:solidFill>
+              </a:rPr>
+              <a:t>C: Cumulative: </a:t>
+            </a:r>
+            <a:r>
+              <a:rPr lang="en-US" sz="2400" dirty="0" err="1" smtClean="0">
+                <a:solidFill>
+                  <a:schemeClr val="tx2"/>
+                </a:solidFill>
+              </a:rPr>
+              <a:t>Tổng</a:t>
+            </a:r>
+            <a:r>
+              <a:rPr lang="en-US" sz="2400" dirty="0" smtClean="0">
+                <a:solidFill>
+                  <a:schemeClr val="tx2"/>
+                </a:solidFill>
+              </a:rPr>
+              <a:t> </a:t>
+            </a:r>
+            <a:r>
+              <a:rPr lang="en-US" sz="2400" dirty="0" err="1" smtClean="0">
+                <a:solidFill>
+                  <a:schemeClr val="tx2"/>
+                </a:solidFill>
+              </a:rPr>
+              <a:t>hợp</a:t>
+            </a:r>
+            <a:r>
+              <a:rPr lang="en-US" sz="2400" dirty="0" smtClean="0">
+                <a:solidFill>
+                  <a:schemeClr val="tx2"/>
+                </a:solidFill>
+              </a:rPr>
+              <a:t>; </a:t>
+            </a:r>
+            <a:r>
+              <a:rPr lang="en-US" sz="2400" dirty="0" smtClean="0">
+                <a:solidFill>
+                  <a:schemeClr val="tx2"/>
+                </a:solidFill>
+              </a:rPr>
+              <a:t>G: Gain: </a:t>
+            </a:r>
+            <a:r>
+              <a:rPr lang="en-US" sz="2400" dirty="0" err="1" smtClean="0">
+                <a:solidFill>
+                  <a:schemeClr val="tx2"/>
+                </a:solidFill>
+              </a:rPr>
+              <a:t>Lợi</a:t>
+            </a:r>
+            <a:r>
+              <a:rPr lang="en-US" sz="2400" dirty="0" smtClean="0">
+                <a:solidFill>
+                  <a:schemeClr val="tx2"/>
+                </a:solidFill>
+              </a:rPr>
+              <a:t> </a:t>
+            </a:r>
+            <a:r>
+              <a:rPr lang="en-US" sz="2400" dirty="0" err="1" smtClean="0">
+                <a:solidFill>
+                  <a:schemeClr val="tx2"/>
+                </a:solidFill>
+              </a:rPr>
+              <a:t>ích</a:t>
+            </a:r>
+            <a:r>
+              <a:rPr lang="en-US" sz="2400" dirty="0" smtClean="0">
+                <a:solidFill>
+                  <a:schemeClr val="tx2"/>
+                </a:solidFill>
+              </a:rPr>
+              <a:t>;</a:t>
+            </a:r>
+          </a:p>
+          <a:p>
+            <a:pPr lvl="1" algn="just"/>
+            <a:r>
+              <a:rPr lang="vi-VN" sz="2400" dirty="0" smtClean="0">
+                <a:solidFill>
+                  <a:schemeClr val="tx2"/>
+                </a:solidFill>
+              </a:rPr>
+              <a:t>NDCG</a:t>
+            </a:r>
+            <a:r>
+              <a:rPr lang="vi-VN" sz="2400" dirty="0" smtClean="0">
+                <a:solidFill>
+                  <a:schemeClr val="tx2"/>
+                </a:solidFill>
+              </a:rPr>
+              <a:t>: </a:t>
             </a:r>
             <a:r>
               <a:rPr lang="vi-VN" altLang="ru-RU" sz="2400" b="1" dirty="0" smtClean="0">
@@ -39131,6 +39210,14 @@
                 </a:solidFill>
               </a:rPr>
               <a:t>ain</a:t>
+            </a:r>
+            <a:r>
+              <a:rPr lang="en-US" altLang="ru-RU" sz="2400" dirty="0" smtClean="0">
+                <a:solidFill>
+                  <a:schemeClr val="tx2"/>
+                </a:solidFill>
+              </a:rPr>
+              <a:t>.</a:t>
             </a:r>
             <a:endParaRPr lang="vi-VN" altLang="ru-RU" sz="2400" dirty="0">
               <a:solidFill>
@@ -39402,8 +39489,8 @@
         </p:nvSpPr>
         <p:spPr>
           <a:xfrm>
-            <a:off x="684213" y="2060575"/>
-            <a:ext cx="8002587" cy="4492625"/>
+            <a:off x="611561" y="1988841"/>
+            <a:ext cx="8075240" cy="4564360"/>
           </a:xfrm>
         </p:spPr>
         <p:txBody>
@@ -39412,23 +39499,170 @@
           <a:p>
             <a:pPr algn="just" eaLnBrk="1" hangingPunct="1"/>
             <a:r>
+              <a:rPr lang="en-US" altLang="ru-RU" dirty="0" err="1" smtClean="0"/>
+              <a:t>Lợi</a:t>
+            </a:r>
+            <a:r>
+              <a:rPr lang="en-US" altLang="ru-RU" dirty="0" smtClean="0"/>
+              <a:t> </a:t>
+            </a:r>
+            <a:r>
+              <a:rPr lang="en-US" altLang="ru-RU" dirty="0" err="1" smtClean="0"/>
+              <a:t>ích</a:t>
+            </a:r>
+            <a:r>
               <a:rPr lang="vi-VN" altLang="ru-RU" dirty="0" smtClean="0"/>
-              <a:t>Mức hữu ích của một kết quả tìm kiếm phụ thuộc vào:</a:t>
-            </a:r>
-          </a:p>
-          <a:p>
-            <a:pPr lvl="1" algn="just" eaLnBrk="1" hangingPunct="1"/>
+              <a:t> </a:t>
+            </a:r>
             <a:r>
               <a:rPr lang="vi-VN" altLang="ru-RU" dirty="0" smtClean="0"/>
-              <a:t>Mức phù hợp của kết quả: Kết quả càng phù hợp thì càng hữu ích với người dùng;</a:t>
-            </a:r>
-          </a:p>
-          <a:p>
-            <a:pPr lvl="1" algn="just" eaLnBrk="1" hangingPunct="1"/>
+              <a:t>của một kết quả tìm kiếm </a:t>
+            </a:r>
+            <a:r>
+              <a:rPr lang="en-US" altLang="ru-RU" dirty="0" err="1" smtClean="0"/>
+              <a:t>tỉ</a:t>
+            </a:r>
+            <a:r>
+              <a:rPr lang="en-US" altLang="ru-RU" dirty="0" smtClean="0"/>
+              <a:t> </a:t>
+            </a:r>
+            <a:r>
+              <a:rPr lang="en-US" altLang="ru-RU" dirty="0" err="1" smtClean="0"/>
+              <a:t>lệ</a:t>
+            </a:r>
+            <a:r>
+              <a:rPr lang="en-US" altLang="ru-RU" dirty="0" smtClean="0"/>
+              <a:t> </a:t>
+            </a:r>
+            <a:r>
+              <a:rPr lang="en-US" altLang="ru-RU" dirty="0" err="1" smtClean="0"/>
+              <a:t>thuận</a:t>
+            </a:r>
+            <a:r>
+              <a:rPr lang="en-US" altLang="ru-RU" dirty="0" smtClean="0"/>
+              <a:t> </a:t>
+            </a:r>
+            <a:r>
+              <a:rPr lang="en-US" altLang="ru-RU" dirty="0" err="1" smtClean="0"/>
+              <a:t>với</a:t>
+            </a:r>
+            <a:r>
+              <a:rPr lang="en-US" altLang="ru-RU" dirty="0" smtClean="0"/>
+              <a:t> m</a:t>
+            </a:r>
             <a:r>
               <a:rPr lang="vi-VN" altLang="ru-RU" dirty="0" smtClean="0"/>
-              <a:t>Vị trí của văn bản trong danh sách kết quả: Khoảng cách đến đầu danh sách càng tăng thì tính hữu ích càng giảm.</a:t>
-            </a:r>
+              <a:t>ức </a:t>
+            </a:r>
+            <a:r>
+              <a:rPr lang="vi-VN" altLang="ru-RU" dirty="0" smtClean="0"/>
+              <a:t>phù hợp của kết quả: Kết quả càng phù hợp thì càng hữu ích với người </a:t>
+            </a:r>
+            <a:r>
+              <a:rPr lang="vi-VN" altLang="ru-RU" dirty="0" smtClean="0"/>
+              <a:t>dùng</a:t>
+            </a:r>
+            <a:r>
+              <a:rPr lang="en-US" altLang="ru-RU" dirty="0" smtClean="0"/>
+              <a:t>, </a:t>
+            </a:r>
+            <a:r>
+              <a:rPr lang="en-US" altLang="ru-RU" dirty="0" err="1" smtClean="0"/>
+              <a:t>và</a:t>
+            </a:r>
+            <a:r>
+              <a:rPr lang="en-US" altLang="ru-RU" dirty="0" smtClean="0"/>
+              <a:t> </a:t>
+            </a:r>
+            <a:r>
+              <a:rPr lang="en-US" altLang="ru-RU" dirty="0" err="1" smtClean="0"/>
+              <a:t>càng</a:t>
+            </a:r>
+            <a:r>
+              <a:rPr lang="en-US" altLang="ru-RU" dirty="0" smtClean="0"/>
+              <a:t> </a:t>
+            </a:r>
+            <a:r>
+              <a:rPr lang="en-US" altLang="ru-RU" dirty="0" err="1" smtClean="0"/>
+              <a:t>đóng</a:t>
+            </a:r>
+            <a:r>
+              <a:rPr lang="en-US" altLang="ru-RU" dirty="0" smtClean="0"/>
+              <a:t> </a:t>
+            </a:r>
+            <a:r>
+              <a:rPr lang="en-US" altLang="ru-RU" dirty="0" err="1" smtClean="0"/>
+              <a:t>góp</a:t>
+            </a:r>
+            <a:r>
+              <a:rPr lang="en-US" altLang="ru-RU" dirty="0" smtClean="0"/>
+              <a:t> </a:t>
+            </a:r>
+            <a:r>
+              <a:rPr lang="en-US" altLang="ru-RU" dirty="0" err="1" smtClean="0"/>
+              <a:t>nhiều</a:t>
+            </a:r>
+            <a:r>
+              <a:rPr lang="en-US" altLang="ru-RU" dirty="0" smtClean="0"/>
+              <a:t> </a:t>
+            </a:r>
+            <a:r>
+              <a:rPr lang="en-US" altLang="ru-RU" dirty="0" err="1" smtClean="0"/>
+              <a:t>vào</a:t>
+            </a:r>
+            <a:r>
+              <a:rPr lang="en-US" altLang="ru-RU" dirty="0" smtClean="0"/>
+              <a:t> </a:t>
+            </a:r>
+            <a:r>
+              <a:rPr lang="en-US" altLang="ru-RU" dirty="0" err="1" smtClean="0"/>
+              <a:t>lợi</a:t>
+            </a:r>
+            <a:r>
+              <a:rPr lang="en-US" altLang="ru-RU" dirty="0" smtClean="0"/>
+              <a:t> </a:t>
+            </a:r>
+            <a:r>
+              <a:rPr lang="en-US" altLang="ru-RU" dirty="0" err="1" smtClean="0"/>
+              <a:t>ích</a:t>
+            </a:r>
+            <a:r>
+              <a:rPr lang="en-US" altLang="ru-RU" dirty="0" smtClean="0"/>
+              <a:t> </a:t>
+            </a:r>
+            <a:r>
+              <a:rPr lang="en-US" altLang="ru-RU" dirty="0" err="1" smtClean="0"/>
+              <a:t>của</a:t>
+            </a:r>
+            <a:r>
+              <a:rPr lang="en-US" altLang="ru-RU" dirty="0" smtClean="0"/>
+              <a:t> </a:t>
+            </a:r>
+            <a:r>
+              <a:rPr lang="en-US" altLang="ru-RU" dirty="0" err="1" smtClean="0"/>
+              <a:t>tập</a:t>
+            </a:r>
+            <a:r>
+              <a:rPr lang="en-US" altLang="ru-RU" dirty="0" smtClean="0"/>
+              <a:t> </a:t>
+            </a:r>
+            <a:r>
+              <a:rPr lang="en-US" altLang="ru-RU" dirty="0" err="1" smtClean="0"/>
+              <a:t>kết</a:t>
+            </a:r>
+            <a:r>
+              <a:rPr lang="en-US" altLang="ru-RU" dirty="0" smtClean="0"/>
+              <a:t> </a:t>
+            </a:r>
+            <a:r>
+              <a:rPr lang="en-US" altLang="ru-RU" dirty="0" err="1" smtClean="0"/>
+              <a:t>quả</a:t>
+            </a:r>
+            <a:r>
+              <a:rPr lang="en-US" altLang="ru-RU" dirty="0" smtClean="0"/>
+              <a:t>.</a:t>
+            </a:r>
+            <a:endParaRPr lang="vi-VN" altLang="ru-RU" dirty="0" smtClean="0"/>
           </a:p>
           <a:p>
             <a:pPr algn="just" eaLnBrk="1" hangingPunct="1"/>
@@ -39665,12 +39899,28 @@
               <a:buNone/>
             </a:pPr>
             <a:r>
-              <a:rPr lang="vi-VN" altLang="ru-RU" sz="4000" dirty="0" smtClean="0">
+              <a:rPr lang="en-US" altLang="ru-RU" sz="4000" dirty="0" err="1" smtClean="0">
                 <a:solidFill>
                   <a:schemeClr val="tx2"/>
                 </a:solidFill>
               </a:rPr>
-              <a:t>Mức hữu ích</a:t>
+              <a:t>Lợi</a:t>
+            </a:r>
+            <a:r>
+              <a:rPr lang="en-US" altLang="ru-RU" sz="4000" dirty="0" smtClean="0">
+                <a:solidFill>
+                  <a:schemeClr val="tx2"/>
+                </a:solidFill>
+              </a:rPr>
+              <a:t> </a:t>
+            </a:r>
+            <a:r>
+              <a:rPr lang="en-US" altLang="ru-RU" sz="4000" dirty="0" err="1" smtClean="0">
+                <a:solidFill>
+                  <a:schemeClr val="tx2"/>
+                </a:solidFill>
+              </a:rPr>
+              <a:t>ích</a:t>
             </a:r>
             <a:endParaRPr lang="vi-VN" altLang="ru-RU" sz="4000" dirty="0">
               <a:solidFill>
@@ -39689,7 +39939,7 @@
         <p:spPr>
           <a:xfrm>
             <a:off x="611560" y="5589240"/>
-            <a:ext cx="8208912" cy="461665"/>
+            <a:ext cx="8208912" cy="830997"/>
           </a:xfrm>
           <a:prstGeom prst="rect">
             <a:avLst/>
@@ -39704,12 +39954,87 @@
           <a:p>
             <a:pPr algn="just"/>
             <a:r>
+              <a:rPr lang="en-US" sz="2400" dirty="0" err="1" smtClean="0">
+                <a:solidFill>
+                  <a:schemeClr val="tx2"/>
+                </a:solidFill>
+              </a:rPr>
+              <a:t>Thuật</a:t>
+            </a:r>
+            <a:r>
+              <a:rPr lang="en-US" sz="2400" dirty="0" smtClean="0">
+                <a:solidFill>
+                  <a:schemeClr val="tx2"/>
+                </a:solidFill>
+              </a:rPr>
+              <a:t> </a:t>
+            </a:r>
+            <a:r>
+              <a:rPr lang="en-US" sz="2400" dirty="0" err="1" smtClean="0">
+                <a:solidFill>
+                  <a:schemeClr val="tx2"/>
+                </a:solidFill>
+              </a:rPr>
+              <a:t>ngữ</a:t>
+            </a:r>
+            <a:r>
+              <a:rPr lang="en-US" sz="2400" dirty="0" smtClean="0">
+                <a:solidFill>
+                  <a:schemeClr val="tx2"/>
+                </a:solidFill>
+              </a:rPr>
+              <a:t>:</a:t>
+            </a:r>
+          </a:p>
+          <a:p>
+            <a:pPr algn="just"/>
+            <a:r>
+              <a:rPr lang="en-US" sz="2400" dirty="0" smtClean="0">
+                <a:solidFill>
+                  <a:schemeClr val="tx2"/>
+                </a:solidFill>
+              </a:rPr>
+              <a:t>	</a:t>
+            </a:r>
+            <a:r>
+              <a:rPr lang="en-US" sz="2400" dirty="0" err="1" smtClean="0">
+                <a:solidFill>
+                  <a:schemeClr val="tx2"/>
+                </a:solidFill>
+              </a:rPr>
+              <a:t>Lợi</a:t>
+            </a:r>
+            <a:r>
+              <a:rPr lang="en-US" sz="2400" dirty="0" smtClean="0">
+                <a:solidFill>
+                  <a:schemeClr val="tx2"/>
+                </a:solidFill>
+              </a:rPr>
+              <a:t> </a:t>
+            </a:r>
+            <a:r>
+              <a:rPr lang="en-US" sz="2400" dirty="0" err="1" smtClean="0">
+                <a:solidFill>
+                  <a:schemeClr val="tx2"/>
+                </a:solidFill>
+              </a:rPr>
+              <a:t>ích</a:t>
+            </a:r>
+            <a:r>
               <a:rPr lang="vi-VN" sz="2400" dirty="0" smtClean="0">
                 <a:solidFill>
                   <a:schemeClr val="tx2"/>
                 </a:solidFill>
               </a:rPr>
-              <a:t>Mức hữu ích: G: Gain</a:t>
+              <a:t>: </a:t>
+            </a:r>
+            <a:r>
+              <a:rPr lang="vi-VN" sz="2400" dirty="0" smtClean="0">
+                <a:solidFill>
+                  <a:schemeClr val="tx2"/>
+                </a:solidFill>
+              </a:rPr>
+              <a:t>G: Gain</a:t>
             </a:r>
             <a:endParaRPr lang="vi-VN" altLang="ru-RU" sz="2400" dirty="0">
               <a:solidFill>
@@ -40000,15 +40325,7 @@
             </a:r>
             <a:r>
               <a:rPr lang="en-US" altLang="ru-RU" dirty="0" err="1" smtClean="0"/>
-              <a:t>mức</a:t>
-            </a:r>
-            <a:r>
-              <a:rPr lang="en-US" altLang="ru-RU" dirty="0" smtClean="0"/>
-              <a:t> </a:t>
-            </a:r>
-            <a:r>
-              <a:rPr lang="en-US" altLang="ru-RU" dirty="0" err="1" smtClean="0"/>
-              <a:t>hữu</a:t>
+              <a:t>lợi</a:t>
             </a:r>
             <a:r>
               <a:rPr lang="en-US" altLang="ru-RU" dirty="0" smtClean="0"/>
@@ -40248,7 +40565,7 @@
         <p:spPr>
           <a:xfrm>
             <a:off x="611560" y="5589240"/>
-            <a:ext cx="8208912" cy="461665"/>
+            <a:ext cx="8208912" cy="830997"/>
           </a:xfrm>
           <a:prstGeom prst="rect">
             <a:avLst/>
@@ -40263,12 +40580,95 @@
           <a:p>
             <a:pPr algn="just"/>
             <a:r>
+              <a:rPr lang="en-US" sz="2400" dirty="0" err="1" smtClean="0">
+                <a:solidFill>
+                  <a:schemeClr val="tx2"/>
+                </a:solidFill>
+              </a:rPr>
+              <a:t>Thuật</a:t>
+            </a:r>
+            <a:r>
+              <a:rPr lang="en-US" sz="2400" dirty="0" smtClean="0">
+                <a:solidFill>
+                  <a:schemeClr val="tx2"/>
+                </a:solidFill>
+              </a:rPr>
+              <a:t> </a:t>
+            </a:r>
+            <a:r>
+              <a:rPr lang="en-US" sz="2400" dirty="0" err="1" smtClean="0">
+                <a:solidFill>
+                  <a:schemeClr val="tx2"/>
+                </a:solidFill>
+              </a:rPr>
+              <a:t>ngữ</a:t>
+            </a:r>
+            <a:r>
+              <a:rPr lang="en-US" sz="2400" dirty="0" smtClean="0">
+                <a:solidFill>
+                  <a:schemeClr val="tx2"/>
+                </a:solidFill>
+              </a:rPr>
+              <a:t>:</a:t>
+            </a:r>
+          </a:p>
+          <a:p>
+            <a:pPr algn="just"/>
+            <a:r>
+              <a:rPr lang="en-US" sz="2400" dirty="0">
+                <a:solidFill>
+                  <a:schemeClr val="tx2"/>
+                </a:solidFill>
+              </a:rPr>
+              <a:t>	</a:t>
+            </a:r>
+            <a:r>
               <a:rPr lang="vi-VN" sz="2400" dirty="0" smtClean="0">
                 <a:solidFill>
                   <a:schemeClr val="tx2"/>
                 </a:solidFill>
               </a:rPr>
-              <a:t>Tổng mức hữu ích: CG: Cumulative Gain</a:t>
+              <a:t>Tổng </a:t>
+            </a:r>
+            <a:r>
+              <a:rPr lang="en-US" sz="2400" dirty="0" err="1" smtClean="0">
+                <a:solidFill>
+                  <a:schemeClr val="tx2"/>
+                </a:solidFill>
+              </a:rPr>
+              <a:t>lợi</a:t>
+            </a:r>
+            <a:r>
+              <a:rPr lang="en-US" sz="2400" dirty="0" smtClean="0">
+                <a:solidFill>
+                  <a:schemeClr val="tx2"/>
+                </a:solidFill>
+              </a:rPr>
+              <a:t> </a:t>
+            </a:r>
+            <a:r>
+              <a:rPr lang="en-US" sz="2400" dirty="0" err="1" smtClean="0">
+                <a:solidFill>
+                  <a:schemeClr val="tx2"/>
+                </a:solidFill>
+              </a:rPr>
+              <a:t>ích</a:t>
+            </a:r>
+            <a:r>
+              <a:rPr lang="vi-VN" sz="2400" dirty="0" smtClean="0">
+                <a:solidFill>
+                  <a:schemeClr val="tx2"/>
+                </a:solidFill>
+              </a:rPr>
+              <a:t>: </a:t>
+            </a:r>
+            <a:r>
+              <a:rPr lang="vi-VN" sz="2400" dirty="0" smtClean="0">
+                <a:solidFill>
+                  <a:schemeClr val="tx2"/>
+                </a:solidFill>
+              </a:rPr>
+              <a:t>CG: Cumulative Gain</a:t>
             </a:r>
             <a:endParaRPr lang="vi-VN" altLang="ru-RU" sz="2400" dirty="0">
               <a:solidFill>
@@ -40745,7 +41145,7 @@
   </a:extraClrSchemeLst>
   <a:extLst>
     <a:ext uri="{05A4C25C-085E-4340-85A3-A5531E510DB2}">
-      <thm15:themeFamily xmlns:thm15="http://schemas.microsoft.com/office/thememl/2012/main" xmlns="" name="Office Theme" id="{62F939B6-93AF-4DB8-9C6B-D6C7DFDC589F}" vid="{4A3C46E8-61CC-4603-A589-7422A47A8E4A}"/>
+      <thm15:themeFamily xmlns="" xmlns:thm15="http://schemas.microsoft.com/office/thememl/2012/main" name="Office Theme" id="{62F939B6-93AF-4DB8-9C6B-D6C7DFDC589F}" vid="{4A3C46E8-61CC-4603-A589-7422A47A8E4A}"/>
     </a:ext>
   </a:extLst>
 </a:theme>
@@ -40794,7 +41194,7 @@
     </a:clrScheme>
     <a:fontScheme name="Office">
       <a:majorFont>
-        <a:latin typeface="Calibri Light" panose="020F0302020204030204"/>
+        <a:latin typeface="Calibri Light"/>
         <a:ea typeface=""/>
         <a:cs typeface=""/>
         <a:font script="Jpan" typeface="ＭＳ Ｐゴシック"/>
@@ -40829,7 +41229,7 @@
         <a:font script="Geor" typeface="Sylfaen"/>
       </a:majorFont>
       <a:minorFont>
-        <a:latin typeface="Calibri" panose="020F0502020204030204"/>
+        <a:latin typeface="Calibri"/>
         <a:ea typeface=""/>
         <a:cs typeface=""/>
         <a:font script="Jpan" typeface="ＭＳ Ｐゴシック"/>
@@ -41006,7 +41406,7 @@
   <a:extraClrSchemeLst/>
   <a:extLst>
     <a:ext uri="{05A4C25C-085E-4340-85A3-A5531E510DB2}">
-      <thm15:themeFamily xmlns:thm15="http://schemas.microsoft.com/office/thememl/2012/main" xmlns="" name="Office Theme" id="{62F939B6-93AF-4DB8-9C6B-D6C7DFDC589F}" vid="{4A3C46E8-61CC-4603-A589-7422A47A8E4A}"/>
+      <thm15:themeFamily xmlns="" xmlns:thm15="http://schemas.microsoft.com/office/thememl/2012/main" name="Office Theme" id="{62F939B6-93AF-4DB8-9C6B-D6C7DFDC589F}" vid="{4A3C46E8-61CC-4603-A589-7422A47A8E4A}"/>
     </a:ext>
   </a:extLst>
 </a:theme>

</xml_diff>

<commit_message>
Dieu chinh yeu cau bai tap 8.2
</commit_message>
<xml_diff>
--- a/Bai 8 Đánh giá kết quả  tìm kiếm_phần 2.pptx
+++ b/Bai 8 Đánh giá kết quả  tìm kiếm_phần 2.pptx
@@ -162,7 +162,7 @@
   </p:defaultTextStyle>
   <p:extLst>
     <p:ext uri="{EFAFB233-063F-42B5-8137-9DF3F51BA10A}">
-      <p15:sldGuideLst xmlns="" xmlns:p15="http://schemas.microsoft.com/office/powerpoint/2012/main">
+      <p15:sldGuideLst xmlns:p15="http://schemas.microsoft.com/office/powerpoint/2012/main" xmlns="">
         <p15:guide id="1" orient="horz" pos="2160">
           <p15:clr>
             <a:srgbClr val="A4A3A4"/>
@@ -23994,7 +23994,7 @@
           <a:graphicData uri="http://schemas.openxmlformats.org/presentationml/2006/ole">
             <mc:AlternateContent xmlns:mc="http://schemas.openxmlformats.org/markup-compatibility/2006">
               <mc:Choice xmlns:v="urn:schemas-microsoft-com:vml" Requires="v">
-                <p:oleObj spid="_x0000_s25177" name="Equation" r:id="rId4" imgW="3009900" imgH="482600" progId="Equation.3">
+                <p:oleObj spid="_x0000_s25205" name="Equation" r:id="rId4" imgW="3009900" imgH="482600" progId="Equation.3">
                   <p:embed/>
                 </p:oleObj>
               </mc:Choice>
@@ -24077,7 +24077,7 @@
           <a:graphicData uri="http://schemas.openxmlformats.org/presentationml/2006/ole">
             <mc:AlternateContent xmlns:mc="http://schemas.openxmlformats.org/markup-compatibility/2006">
               <mc:Choice xmlns:v="urn:schemas-microsoft-com:vml" Requires="v">
-                <p:oleObj spid="_x0000_s25178" name="Equation" r:id="rId6" imgW="3035300" imgH="482600" progId="Equation.3">
+                <p:oleObj spid="_x0000_s25206" name="Equation" r:id="rId6" imgW="3035300" imgH="482600" progId="Equation.3">
                   <p:embed/>
                 </p:oleObj>
               </mc:Choice>
@@ -24160,7 +24160,7 @@
           <a:graphicData uri="http://schemas.openxmlformats.org/presentationml/2006/ole">
             <mc:AlternateContent xmlns:mc="http://schemas.openxmlformats.org/markup-compatibility/2006">
               <mc:Choice xmlns:v="urn:schemas-microsoft-com:vml" Requires="v">
-                <p:oleObj spid="_x0000_s25179" name="Equation" r:id="rId8" imgW="3048000" imgH="482600" progId="Equation.3">
+                <p:oleObj spid="_x0000_s25207" name="Equation" r:id="rId8" imgW="3048000" imgH="482600" progId="Equation.3">
                   <p:embed/>
                 </p:oleObj>
               </mc:Choice>
@@ -24243,7 +24243,7 @@
           <a:graphicData uri="http://schemas.openxmlformats.org/presentationml/2006/ole">
             <mc:AlternateContent xmlns:mc="http://schemas.openxmlformats.org/markup-compatibility/2006">
               <mc:Choice xmlns:v="urn:schemas-microsoft-com:vml" Requires="v">
-                <p:oleObj spid="_x0000_s25180" name="Equation" r:id="rId10" imgW="1841500" imgH="228600" progId="Equation.3">
+                <p:oleObj spid="_x0000_s25208" name="Equation" r:id="rId10" imgW="1841500" imgH="228600" progId="Equation.3">
                   <p:embed/>
                 </p:oleObj>
               </mc:Choice>
@@ -34765,8 +34765,8 @@
         </p:nvSpPr>
         <p:spPr>
           <a:xfrm>
-            <a:off x="611561" y="2017713"/>
-            <a:ext cx="4968552" cy="4506912"/>
+            <a:off x="683568" y="1973089"/>
+            <a:ext cx="5112568" cy="4840287"/>
           </a:xfrm>
           <a:prstGeom prst="rect">
             <a:avLst/>
@@ -34971,7 +34971,7 @@
               <a:defRPr/>
             </a:pPr>
             <a:r>
-              <a:rPr lang="vi-VN" sz="2400" dirty="0" smtClean="0"/>
+              <a:rPr lang="vi-VN" sz="2200" dirty="0" smtClean="0"/>
               <a:t>Giả sử hệ thống tìm kiếm trả về tập kết quả là {4, 5, 6, 7, 8}:</a:t>
             </a:r>
           </a:p>
@@ -34988,8 +34988,48 @@
               <a:defRPr/>
             </a:pPr>
             <a:r>
-              <a:rPr lang="vi-VN" sz="2400" dirty="0" smtClean="0"/>
-              <a:t>a) Tính kappa giữa hai đánh giá;</a:t>
+              <a:rPr lang="vi-VN" sz="2200" dirty="0" smtClean="0"/>
+              <a:t>a) Tính kappa giữa hai </a:t>
+            </a:r>
+            <a:r>
+              <a:rPr lang="en-US" sz="2200" dirty="0" err="1" smtClean="0"/>
+              <a:t>danh</a:t>
+            </a:r>
+            <a:r>
+              <a:rPr lang="en-US" sz="2200" dirty="0" smtClean="0"/>
+              <a:t> </a:t>
+            </a:r>
+            <a:r>
+              <a:rPr lang="en-US" sz="2200" dirty="0" err="1" smtClean="0"/>
+              <a:t>sách</a:t>
+            </a:r>
+            <a:r>
+              <a:rPr lang="en-US" sz="2200" dirty="0" smtClean="0"/>
+              <a:t> </a:t>
+            </a:r>
+            <a:r>
+              <a:rPr lang="en-US" sz="2200" dirty="0" err="1" smtClean="0"/>
+              <a:t>kết</a:t>
+            </a:r>
+            <a:r>
+              <a:rPr lang="en-US" sz="2200" dirty="0" smtClean="0"/>
+              <a:t> </a:t>
+            </a:r>
+            <a:r>
+              <a:rPr lang="en-US" sz="2200" dirty="0" err="1" smtClean="0"/>
+              <a:t>quả</a:t>
+            </a:r>
+            <a:r>
+              <a:rPr lang="en-US" sz="2200" dirty="0" smtClean="0"/>
+              <a:t> </a:t>
+            </a:r>
+            <a:r>
+              <a:rPr lang="vi-VN" sz="2200" dirty="0" smtClean="0"/>
+              <a:t>đánh </a:t>
+            </a:r>
+            <a:r>
+              <a:rPr lang="vi-VN" sz="2200" dirty="0" smtClean="0"/>
+              <a:t>giá;</a:t>
             </a:r>
           </a:p>
           <a:p>
@@ -35005,9 +35045,70 @@
               <a:defRPr/>
             </a:pPr>
             <a:r>
-              <a:rPr lang="vi-VN" sz="2400" dirty="0" smtClean="0"/>
-              <a:t>b) Tính P, R và F1 trong trường hợp văn bản được coi là phù hợp nếu hai đánh giá thống nhất;</a:t>
-            </a:r>
+              <a:rPr lang="vi-VN" sz="2200" dirty="0" smtClean="0"/>
+              <a:t>b) Tính P, R và F1 trong trường hợp văn bản được coi là phù hợp nếu </a:t>
+            </a:r>
+            <a:r>
+              <a:rPr lang="en-US" sz="2200" dirty="0" err="1" smtClean="0"/>
+              <a:t>cả</a:t>
+            </a:r>
+            <a:r>
+              <a:rPr lang="en-US" sz="2200" dirty="0" smtClean="0"/>
+              <a:t> </a:t>
+            </a:r>
+            <a:r>
+              <a:rPr lang="vi-VN" sz="2200" dirty="0" smtClean="0"/>
+              <a:t>hai </a:t>
+            </a:r>
+            <a:r>
+              <a:rPr lang="en-US" sz="2200" dirty="0" err="1" smtClean="0"/>
+              <a:t>cùng</a:t>
+            </a:r>
+            <a:r>
+              <a:rPr lang="en-US" sz="2200" dirty="0" smtClean="0"/>
+              <a:t> </a:t>
+            </a:r>
+            <a:r>
+              <a:rPr lang="en-US" sz="2200" dirty="0" err="1" smtClean="0"/>
+              <a:t>đánh</a:t>
+            </a:r>
+            <a:r>
+              <a:rPr lang="en-US" sz="2200" dirty="0" smtClean="0"/>
+              <a:t> </a:t>
+            </a:r>
+            <a:r>
+              <a:rPr lang="en-US" sz="2200" dirty="0" err="1" smtClean="0"/>
+              <a:t>giá</a:t>
+            </a:r>
+            <a:r>
+              <a:rPr lang="en-US" sz="2200" dirty="0" smtClean="0"/>
+              <a:t> </a:t>
+            </a:r>
+            <a:r>
+              <a:rPr lang="en-US" sz="2200" dirty="0" err="1" smtClean="0"/>
+              <a:t>là</a:t>
+            </a:r>
+            <a:r>
+              <a:rPr lang="en-US" sz="2200" dirty="0" smtClean="0"/>
+              <a:t> </a:t>
+            </a:r>
+            <a:r>
+              <a:rPr lang="en-US" sz="2200" dirty="0" err="1" smtClean="0"/>
+              <a:t>phù</a:t>
+            </a:r>
+            <a:r>
+              <a:rPr lang="en-US" sz="2200" dirty="0" smtClean="0"/>
+              <a:t> </a:t>
+            </a:r>
+            <a:r>
+              <a:rPr lang="en-US" sz="2200" dirty="0" err="1" smtClean="0"/>
+              <a:t>hợp</a:t>
+            </a:r>
+            <a:r>
+              <a:rPr lang="vi-VN" sz="2200" dirty="0" smtClean="0"/>
+              <a:t>;</a:t>
+            </a:r>
+            <a:endParaRPr lang="vi-VN" sz="2200" dirty="0" smtClean="0"/>
           </a:p>
           <a:p>
             <a:pPr marL="0" indent="0" eaLnBrk="1" hangingPunct="1">
@@ -35022,12 +35123,8 @@
               <a:defRPr/>
             </a:pPr>
             <a:r>
-              <a:rPr lang="vi-VN" sz="2400" dirty="0" smtClean="0"/>
-              <a:t>c) Tính P, R và F1 trong trường hợp văn bản được coi là phù hợp nếu một trong hai đánh giá là phù </a:t>
-            </a:r>
-            <a:r>
-              <a:rPr lang="vi-VN" sz="2400" smtClean="0"/>
-              <a:t>hợp.</a:t>
+              <a:rPr lang="vi-VN" sz="2200" dirty="0" smtClean="0"/>
+              <a:t>c) Tính P, R và F1 trong trường hợp văn bản được coi là phù hợp nếu một trong hai đánh giá là phù hợp.</a:t>
             </a:r>
           </a:p>
           <a:p>
@@ -35043,12 +35140,80 @@
               <a:defRPr/>
             </a:pPr>
             <a:r>
-              <a:rPr lang="vi-VN" sz="2400" smtClean="0"/>
+              <a:rPr lang="vi-VN" sz="2200" dirty="0" smtClean="0"/>
               <a:t>d) Thiết </a:t>
             </a:r>
             <a:r>
-              <a:rPr lang="en-US" sz="2400" smtClean="0"/>
-              <a:t>lập hai dãy bất kỳ để:</a:t>
+              <a:rPr lang="en-US" sz="2200" dirty="0" err="1" smtClean="0"/>
+              <a:t>lập</a:t>
+            </a:r>
+            <a:r>
+              <a:rPr lang="en-US" sz="2200" dirty="0" smtClean="0"/>
+              <a:t> </a:t>
+            </a:r>
+            <a:r>
+              <a:rPr lang="en-US" sz="2200" dirty="0" err="1" smtClean="0"/>
+              <a:t>hai</a:t>
+            </a:r>
+            <a:r>
+              <a:rPr lang="en-US" sz="2200" dirty="0" smtClean="0"/>
+              <a:t> </a:t>
+            </a:r>
+            <a:r>
+              <a:rPr lang="en-US" sz="2200" dirty="0" err="1" smtClean="0"/>
+              <a:t>danh</a:t>
+            </a:r>
+            <a:r>
+              <a:rPr lang="en-US" sz="2200" dirty="0" smtClean="0"/>
+              <a:t> </a:t>
+            </a:r>
+            <a:r>
+              <a:rPr lang="en-US" sz="2200" dirty="0" err="1" smtClean="0"/>
+              <a:t>sách</a:t>
+            </a:r>
+            <a:r>
+              <a:rPr lang="en-US" sz="2200" dirty="0" smtClean="0"/>
+              <a:t> </a:t>
+            </a:r>
+            <a:r>
+              <a:rPr lang="en-US" sz="2200" dirty="0" err="1" smtClean="0"/>
+              <a:t>kết</a:t>
+            </a:r>
+            <a:r>
+              <a:rPr lang="en-US" sz="2200" dirty="0" smtClean="0"/>
+              <a:t> </a:t>
+            </a:r>
+            <a:r>
+              <a:rPr lang="en-US" sz="2200" dirty="0" err="1" smtClean="0"/>
+              <a:t>quả</a:t>
+            </a:r>
+            <a:r>
+              <a:rPr lang="en-US" sz="2200" dirty="0" smtClean="0"/>
+              <a:t> </a:t>
+            </a:r>
+            <a:r>
+              <a:rPr lang="en-US" sz="2200" dirty="0" err="1" smtClean="0"/>
+              <a:t>bất</a:t>
+            </a:r>
+            <a:r>
+              <a:rPr lang="en-US" sz="2200" dirty="0" smtClean="0"/>
+              <a:t> </a:t>
+            </a:r>
+            <a:r>
+              <a:rPr lang="en-US" sz="2200" dirty="0" err="1" smtClean="0"/>
+              <a:t>kỳ</a:t>
+            </a:r>
+            <a:r>
+              <a:rPr lang="en-US" sz="2200" dirty="0" smtClean="0"/>
+              <a:t> </a:t>
+            </a:r>
+            <a:r>
+              <a:rPr lang="en-US" sz="2200" dirty="0" err="1" smtClean="0"/>
+              <a:t>để</a:t>
+            </a:r>
+            <a:r>
+              <a:rPr lang="en-US" sz="2200" dirty="0" smtClean="0"/>
+              <a:t>:</a:t>
             </a:r>
           </a:p>
           <a:p>
@@ -35064,10 +35229,30 @@
               <a:defRPr/>
             </a:pPr>
             <a:r>
-              <a:rPr lang="en-US" sz="2400" smtClean="0"/>
-              <a:t>kappa = -1; kappa = 1;</a:t>
-            </a:r>
-            <a:endParaRPr lang="vi-VN" sz="2400" dirty="0" smtClean="0"/>
+              <a:rPr lang="en-US" sz="2200" dirty="0"/>
+              <a:t> </a:t>
+            </a:r>
+            <a:r>
+              <a:rPr lang="en-US" sz="2200" dirty="0" smtClean="0"/>
+              <a:t>   d1) </a:t>
+            </a:r>
+            <a:r>
+              <a:rPr lang="en-US" sz="2200" dirty="0" smtClean="0"/>
+              <a:t>kappa </a:t>
+            </a:r>
+            <a:r>
+              <a:rPr lang="en-US" sz="2200" dirty="0" smtClean="0"/>
+              <a:t>= -1; </a:t>
+            </a:r>
+            <a:r>
+              <a:rPr lang="en-US" sz="2200" dirty="0" smtClean="0"/>
+              <a:t>d2) kappa </a:t>
+            </a:r>
+            <a:r>
+              <a:rPr lang="en-US" sz="2200" dirty="0" smtClean="0"/>
+              <a:t>= 1;</a:t>
+            </a:r>
+            <a:endParaRPr lang="vi-VN" sz="2200" dirty="0" smtClean="0"/>
           </a:p>
         </p:txBody>
       </p:sp>
@@ -35087,8 +35272,8 @@
         </p:blipFill>
         <p:spPr>
           <a:xfrm>
-            <a:off x="5580112" y="2017713"/>
-            <a:ext cx="3572552" cy="4506912"/>
+            <a:off x="5751977" y="2017713"/>
+            <a:ext cx="3287724" cy="4147591"/>
           </a:xfrm>
           <a:prstGeom prst="rect">
             <a:avLst/>
@@ -36589,7 +36774,7 @@
           <a:graphicData uri="http://schemas.openxmlformats.org/presentationml/2006/ole">
             <mc:AlternateContent xmlns:mc="http://schemas.openxmlformats.org/markup-compatibility/2006">
               <mc:Choice xmlns:v="urn:schemas-microsoft-com:vml" Requires="v">
-                <p:oleObj spid="_x0000_s8603" name="Equation" r:id="rId3" imgW="736280" imgH="393529" progId="Equation.3">
+                <p:oleObj spid="_x0000_s8624" name="Equation" r:id="rId3" imgW="736280" imgH="393529" progId="Equation.3">
                   <p:embed/>
                 </p:oleObj>
               </mc:Choice>
@@ -36690,7 +36875,7 @@
           <a:graphicData uri="http://schemas.openxmlformats.org/presentationml/2006/ole">
             <mc:AlternateContent xmlns:mc="http://schemas.openxmlformats.org/markup-compatibility/2006">
               <mc:Choice xmlns:v="urn:schemas-microsoft-com:vml" Requires="v">
-                <p:oleObj spid="_x0000_s8604" name="Equation" r:id="rId5" imgW="1435100" imgH="444500" progId="Equation.3">
+                <p:oleObj spid="_x0000_s8625" name="Equation" r:id="rId5" imgW="1435100" imgH="444500" progId="Equation.3">
                   <p:embed/>
                 </p:oleObj>
               </mc:Choice>
@@ -36785,7 +36970,7 @@
           <a:graphicData uri="http://schemas.openxmlformats.org/presentationml/2006/ole">
             <mc:AlternateContent xmlns:mc="http://schemas.openxmlformats.org/markup-compatibility/2006">
               <mc:Choice xmlns:v="urn:schemas-microsoft-com:vml" Requires="v">
-                <p:oleObj spid="_x0000_s8605" name="Equation" r:id="rId7" imgW="1612900" imgH="431800" progId="Equation.3">
+                <p:oleObj spid="_x0000_s8626" name="Equation" r:id="rId7" imgW="1612900" imgH="431800" progId="Equation.3">
                   <p:embed/>
                 </p:oleObj>
               </mc:Choice>
@@ -41212,7 +41397,7 @@
   </a:extraClrSchemeLst>
   <a:extLst>
     <a:ext uri="{05A4C25C-085E-4340-85A3-A5531E510DB2}">
-      <thm15:themeFamily xmlns="" xmlns:thm15="http://schemas.microsoft.com/office/thememl/2012/main" name="Office Theme" id="{62F939B6-93AF-4DB8-9C6B-D6C7DFDC589F}" vid="{4A3C46E8-61CC-4603-A589-7422A47A8E4A}"/>
+      <thm15:themeFamily xmlns:thm15="http://schemas.microsoft.com/office/thememl/2012/main" xmlns="" name="Office Theme" id="{62F939B6-93AF-4DB8-9C6B-D6C7DFDC589F}" vid="{4A3C46E8-61CC-4603-A589-7422A47A8E4A}"/>
     </a:ext>
   </a:extLst>
 </a:theme>
@@ -41473,7 +41658,7 @@
   <a:extraClrSchemeLst/>
   <a:extLst>
     <a:ext uri="{05A4C25C-085E-4340-85A3-A5531E510DB2}">
-      <thm15:themeFamily xmlns="" xmlns:thm15="http://schemas.microsoft.com/office/thememl/2012/main" name="Office Theme" id="{62F939B6-93AF-4DB8-9C6B-D6C7DFDC589F}" vid="{4A3C46E8-61CC-4603-A589-7422A47A8E4A}"/>
+      <thm15:themeFamily xmlns:thm15="http://schemas.microsoft.com/office/thememl/2012/main" xmlns="" name="Office Theme" id="{62F939B6-93AF-4DB8-9C6B-D6C7DFDC589F}" vid="{4A3C46E8-61CC-4603-A589-7422A47A8E4A}"/>
     </a:ext>
   </a:extLst>
 </a:theme>

</xml_diff>